<commit_message>
Added sustainability to thesis + edited poster
</commit_message>
<xml_diff>
--- a/poster/poster_matthew_gilpin.pptx
+++ b/poster/poster_matthew_gilpin.pptx
@@ -253,7 +253,7 @@
               <a:pPr>
                 <a:defRPr/>
               </a:pPr>
-              <a:t>9/24/2023</a:t>
+              <a:t>9/29/2023</a:t>
             </a:fld>
             <a:endParaRPr lang="en-US"/>
           </a:p>
@@ -763,7 +763,7 @@
               <a:pPr>
                 <a:defRPr/>
               </a:pPr>
-              <a:t>9/24/2023</a:t>
+              <a:t>9/29/2023</a:t>
             </a:fld>
             <a:endParaRPr lang="en-US"/>
           </a:p>
@@ -1789,7 +1789,7 @@
               <a:pPr>
                 <a:defRPr/>
               </a:pPr>
-              <a:t>9/24/2023</a:t>
+              <a:t>9/29/2023</a:t>
             </a:fld>
             <a:endParaRPr lang="en-US"/>
           </a:p>
@@ -2338,114 +2338,21 @@
           <a:lstStyle/>
           <a:p>
             <a:r>
-              <a:rPr lang="en-US" sz="1800">
+              <a:rPr lang="en-US" sz="1800" dirty="0">
                 <a:latin typeface="Bodoni MT" charset="0"/>
                 <a:cs typeface="Helvetica Neue" charset="0"/>
               </a:rPr>
-              <a:t>MAIN HEADINGS – BODONI MT 18PT ALL CAPS</a:t>
-            </a:r>
-          </a:p>
-          <a:p>
-            <a:endParaRPr lang="en-US" sz="1600">
+              <a:t>PROJECT SCOPE</a:t>
+            </a:r>
+          </a:p>
+          <a:p>
+            <a:endParaRPr lang="en-US" sz="1600" dirty="0">
               <a:latin typeface="Bodoni MT" charset="0"/>
               <a:cs typeface="Helvetica Neue" charset="0"/>
             </a:endParaRPr>
           </a:p>
           <a:p>
-            <a:r>
-              <a:rPr lang="en-US" b="1">
-                <a:latin typeface="Helvetica Neue" charset="0"/>
-                <a:cs typeface="Helvetica Neue" charset="0"/>
-              </a:rPr>
-              <a:t>Subheadings – Helvetica Neue Bold 14pt</a:t>
-            </a:r>
-          </a:p>
-          <a:p>
-            <a:r>
-              <a:rPr lang="en-US">
-                <a:latin typeface="Helvetica Neue" charset="0"/>
-                <a:cs typeface="Helvetica Neue" charset="0"/>
-              </a:rPr>
-              <a:t>Body Text – Helvetica Neue 14pt (min 12pt)</a:t>
-            </a:r>
-          </a:p>
-          <a:p>
-            <a:endParaRPr lang="en-US">
-              <a:latin typeface="Helvetica Neue" charset="0"/>
-              <a:cs typeface="Helvetica Neue" charset="0"/>
-            </a:endParaRPr>
-          </a:p>
-          <a:p>
-            <a:r>
-              <a:rPr lang="en-US" b="1">
-                <a:latin typeface="Helvetica Neue" charset="0"/>
-                <a:cs typeface="Helvetica Neue" charset="0"/>
-              </a:rPr>
-              <a:t>Don’t have the above fonts installed?</a:t>
-            </a:r>
-          </a:p>
-          <a:p>
-            <a:r>
-              <a:rPr lang="en-US">
-                <a:latin typeface="Helvetica Neue" charset="0"/>
-                <a:cs typeface="Helvetica Neue" charset="0"/>
-              </a:rPr>
-              <a:t>Substitutes for Bodoni MT:</a:t>
-            </a:r>
-          </a:p>
-          <a:p>
-            <a:r>
-              <a:rPr lang="en-US">
-                <a:latin typeface="Didot" charset="0"/>
-                <a:cs typeface="Helvetica Neue" charset="0"/>
-              </a:rPr>
-              <a:t>Didot on Apple</a:t>
-            </a:r>
-          </a:p>
-          <a:p>
-            <a:r>
-              <a:rPr lang="en-US">
-                <a:latin typeface="Times New Roman" charset="0"/>
-                <a:cs typeface="Times New Roman" charset="0"/>
-              </a:rPr>
-              <a:t>or Times New Roman (Apple &amp; Windows)</a:t>
-            </a:r>
-          </a:p>
-          <a:p>
-            <a:endParaRPr lang="en-US">
-              <a:latin typeface="Helvetica Neue" charset="0"/>
-              <a:cs typeface="Helvetica Neue" charset="0"/>
-            </a:endParaRPr>
-          </a:p>
-          <a:p>
-            <a:r>
-              <a:rPr lang="en-US">
-                <a:latin typeface="Helvetica Neue" charset="0"/>
-                <a:cs typeface="Helvetica Neue" charset="0"/>
-              </a:rPr>
-              <a:t>Substitutes for Helvetica Neue:</a:t>
-            </a:r>
-          </a:p>
-          <a:p>
-            <a:r>
-              <a:rPr lang="en-US">
-                <a:latin typeface="Helvetica" charset="0"/>
-                <a:cs typeface="Helvetica" charset="0"/>
-              </a:rPr>
-              <a:t>Helvetica (Apple)</a:t>
-            </a:r>
-          </a:p>
-          <a:p>
-            <a:r>
-              <a:rPr lang="en-US">
-                <a:latin typeface="Arial" charset="0"/>
-                <a:cs typeface="Arial" charset="0"/>
-              </a:rPr>
-              <a:t>or Arial (Apple &amp; Windows)</a:t>
-            </a:r>
-          </a:p>
-          <a:p>
-            <a:endParaRPr lang="en-US">
+            <a:endParaRPr lang="en-US" dirty="0">
               <a:latin typeface="Helvetica Neue" charset="0"/>
               <a:cs typeface="Helvetica Neue" charset="0"/>
             </a:endParaRPr>
@@ -2473,11 +2380,11 @@
           <a:lstStyle/>
           <a:p>
             <a:r>
-              <a:rPr lang="en-US" cap="none">
+              <a:rPr lang="en-US" cap="none" dirty="0">
                 <a:latin typeface="Bodoni MT" charset="0"/>
                 <a:cs typeface="Didot" charset="0"/>
               </a:rPr>
-              <a:t>TITLE OF YOUR PROJECT (BODONI MT 48PT)</a:t>
+              <a:t>FPGA Ethernet Packet Filter with Webserver</a:t>
             </a:r>
           </a:p>
         </p:txBody>
@@ -2508,11 +2415,11 @@
               </a:spcBef>
             </a:pPr>
             <a:r>
-              <a:rPr lang="en-US">
+              <a:rPr lang="en-US" dirty="0">
                 <a:latin typeface="Helvetica Neue" charset="0"/>
                 <a:cs typeface="Helvetica Neue" charset="0"/>
               </a:rPr>
-              <a:t>Your Name &amp; Supervisor Name (Helvetica Neue 24pt)</a:t>
+              <a:t>Matthew Gilpin, Supervised by Dr Matthew D’Souza</a:t>
             </a:r>
           </a:p>
         </p:txBody>
@@ -2538,166 +2445,10 @@
           <a:bodyPr/>
           <a:lstStyle/>
           <a:p>
-            <a:r>
-              <a:rPr lang="en-US" b="1">
-                <a:latin typeface="Helvetica Neue" charset="0"/>
-                <a:cs typeface="Helvetica Neue" charset="0"/>
-              </a:rPr>
-              <a:t>General Hints &amp; Tips</a:t>
-            </a:r>
-          </a:p>
-          <a:p>
-            <a:r>
-              <a:rPr lang="en-US" b="1" i="1">
-                <a:latin typeface="Helvetica Neue" charset="0"/>
-                <a:cs typeface="Helvetica Neue" charset="0"/>
-              </a:rPr>
-              <a:t>Do not </a:t>
-            </a:r>
-            <a:r>
-              <a:rPr lang="en-US">
-                <a:latin typeface="Helvetica Neue" charset="0"/>
-                <a:cs typeface="Helvetica Neue" charset="0"/>
-              </a:rPr>
-              <a:t>change the colour/size/logos/positioning of the Slide Master.</a:t>
-            </a:r>
-          </a:p>
-          <a:p>
-            <a:r>
-              <a:rPr lang="en-US">
-                <a:latin typeface="Helvetica Neue" charset="0"/>
-                <a:cs typeface="Helvetica Neue" charset="0"/>
-              </a:rPr>
-              <a:t>This is a standard format across all Innovation Expo posters.</a:t>
-            </a:r>
-          </a:p>
-          <a:p>
-            <a:r>
-              <a:rPr lang="en-US" b="1" i="1">
-                <a:latin typeface="Helvetica Neue" charset="0"/>
-                <a:cs typeface="Helvetica Neue" charset="0"/>
-              </a:rPr>
-              <a:t>Do not </a:t>
-            </a:r>
-            <a:r>
-              <a:rPr lang="en-US">
-                <a:latin typeface="Helvetica Neue" charset="0"/>
-                <a:cs typeface="Helvetica Neue" charset="0"/>
-              </a:rPr>
-              <a:t>add other corporate logos. This is an infringement of copyright, unless you have express permission to do so.</a:t>
-            </a:r>
-          </a:p>
-          <a:p>
-            <a:r>
-              <a:rPr lang="en-US" b="1" i="1">
-                <a:latin typeface="Helvetica Neue" charset="0"/>
-                <a:cs typeface="Helvetica Neue" charset="0"/>
-              </a:rPr>
-              <a:t>Do</a:t>
-            </a:r>
-            <a:r>
-              <a:rPr lang="en-US">
-                <a:latin typeface="Helvetica Neue" charset="0"/>
-                <a:cs typeface="Helvetica Neue" charset="0"/>
-              </a:rPr>
-              <a:t> use this space as creatively as you wish.</a:t>
-            </a:r>
-          </a:p>
-          <a:p>
-            <a:r>
-              <a:rPr lang="en-US" b="1" i="1">
-                <a:latin typeface="Helvetica Neue" charset="0"/>
-                <a:cs typeface="Helvetica Neue" charset="0"/>
-              </a:rPr>
-              <a:t>Avoid </a:t>
-            </a:r>
-            <a:r>
-              <a:rPr lang="en-US">
-                <a:latin typeface="Helvetica Neue" charset="0"/>
-                <a:cs typeface="Helvetica Neue" charset="0"/>
-              </a:rPr>
-              <a:t>using large background colours – doesn’t print well.</a:t>
-            </a:r>
-          </a:p>
-          <a:p>
-            <a:r>
-              <a:rPr lang="en-US" b="1" i="1">
-                <a:latin typeface="Helvetica Neue" charset="0"/>
-                <a:cs typeface="Helvetica Neue" charset="0"/>
-              </a:rPr>
-              <a:t>Stick to </a:t>
-            </a:r>
-            <a:r>
-              <a:rPr lang="en-US">
-                <a:latin typeface="Helvetica Neue" charset="0"/>
-                <a:cs typeface="Helvetica Neue" charset="0"/>
-              </a:rPr>
-              <a:t>the basic fonts &amp; sizes (left) – these read clearly. If you need to reduce the text size, you are trying to put too much on your poster.</a:t>
-            </a:r>
-          </a:p>
-          <a:p>
-            <a:r>
-              <a:rPr lang="en-US" b="1" i="1">
-                <a:latin typeface="Helvetica Neue" charset="0"/>
-                <a:cs typeface="Helvetica Neue" charset="0"/>
-              </a:rPr>
-              <a:t>As a check</a:t>
-            </a:r>
-            <a:r>
-              <a:rPr lang="en-US">
-                <a:latin typeface="Helvetica Neue" charset="0"/>
-                <a:cs typeface="Helvetica Neue" charset="0"/>
-              </a:rPr>
-              <a:t>, print “scaled to fit” onto A4 and read at arms length.</a:t>
-            </a:r>
-          </a:p>
-          <a:p>
-            <a:r>
-              <a:rPr lang="en-US" b="1" i="1">
-                <a:latin typeface="Helvetica Neue" charset="0"/>
-                <a:cs typeface="Helvetica Neue" charset="0"/>
-              </a:rPr>
-              <a:t>Save </a:t>
-            </a:r>
-            <a:r>
-              <a:rPr lang="en-US">
-                <a:latin typeface="Helvetica Neue" charset="0"/>
-                <a:cs typeface="Helvetica Neue" charset="0"/>
-              </a:rPr>
-              <a:t>your poster as you work on it.</a:t>
-            </a:r>
-          </a:p>
-          <a:p>
-            <a:r>
-              <a:rPr lang="en-US" b="1" i="1">
-                <a:latin typeface="Helvetica Neue" charset="0"/>
-                <a:cs typeface="Helvetica Neue" charset="0"/>
-              </a:rPr>
-              <a:t>You shouldn’t</a:t>
-            </a:r>
-            <a:r>
-              <a:rPr lang="en-US">
-                <a:latin typeface="Helvetica Neue" charset="0"/>
-                <a:cs typeface="Helvetica Neue" charset="0"/>
-              </a:rPr>
-              <a:t> need to change the sizing of this file, it should already be landscape format with width: 41cm and height: 28.7 cm (A3 with 5 mm borders all around).</a:t>
-            </a:r>
-          </a:p>
-          <a:p>
-            <a:r>
-              <a:rPr lang="en-US" b="1" i="1">
-                <a:latin typeface="Helvetica Neue" charset="0"/>
-                <a:cs typeface="Helvetica Neue" charset="0"/>
-              </a:rPr>
-              <a:t>The title </a:t>
-            </a:r>
-            <a:r>
-              <a:rPr lang="en-US">
-                <a:latin typeface="Helvetica Neue" charset="0"/>
-                <a:cs typeface="Helvetica Neue" charset="0"/>
-              </a:rPr>
-              <a:t>may look to close to the top edge – don’t be tempted to change it. It allows for the extra 5mm from the printing.</a:t>
-            </a:r>
+            <a:endParaRPr lang="en-US" dirty="0">
+              <a:latin typeface="Helvetica Neue" charset="0"/>
+              <a:cs typeface="Helvetica Neue" charset="0"/>
+            </a:endParaRPr>
           </a:p>
         </p:txBody>
       </p:sp>

</xml_diff>

<commit_message>
Updated powerpoint for poster
</commit_message>
<xml_diff>
--- a/poster/poster_matthew_gilpin.pptx
+++ b/poster/poster_matthew_gilpin.pptx
@@ -2501,7 +2501,16 @@
           <a:bodyPr/>
           <a:lstStyle/>
           <a:p>
-            <a:endParaRPr lang="en-US">
+            <a:r>
+              <a:rPr lang="en-US" sz="1800" dirty="0">
+                <a:latin typeface="Bodoni MT" charset="0"/>
+                <a:cs typeface="Helvetica Neue" charset="0"/>
+              </a:rPr>
+              <a:t>RESULTS</a:t>
+            </a:r>
+          </a:p>
+          <a:p>
+            <a:endParaRPr lang="en-US" dirty="0">
               <a:latin typeface="Helvetica Neue" charset="0"/>
               <a:cs typeface="Helvetica Neue" charset="0"/>
             </a:endParaRPr>

</xml_diff>

<commit_message>
Updated to use 200 size register for pf.
</commit_message>
<xml_diff>
--- a/poster/poster_matthew_gilpin.pptx
+++ b/poster/poster_matthew_gilpin.pptx
@@ -253,7 +253,7 @@
               <a:pPr>
                 <a:defRPr/>
               </a:pPr>
-              <a:t>9/29/2023</a:t>
+              <a:t>9/30/2023</a:t>
             </a:fld>
             <a:endParaRPr lang="en-US"/>
           </a:p>
@@ -763,7 +763,7 @@
               <a:pPr>
                 <a:defRPr/>
               </a:pPr>
-              <a:t>9/29/2023</a:t>
+              <a:t>9/30/2023</a:t>
             </a:fld>
             <a:endParaRPr lang="en-US"/>
           </a:p>
@@ -1789,7 +1789,7 @@
               <a:pPr>
                 <a:defRPr/>
               </a:pPr>
-              <a:t>9/29/2023</a:t>
+              <a:t>9/30/2023</a:t>
             </a:fld>
             <a:endParaRPr lang="en-US"/>
           </a:p>
@@ -2346,14 +2346,15 @@
             </a:r>
           </a:p>
           <a:p>
+            <a:r>
+              <a:rPr lang="en-US" sz="1600" dirty="0">
+                <a:latin typeface="Helvetica Neue" charset="0"/>
+                <a:cs typeface="Helvetica Neue" charset="0"/>
+              </a:rPr>
+              <a:t>Increase embedded edge networks by using hardware based packet filters. </a:t>
+            </a:r>
             <a:endParaRPr lang="en-US" sz="1600" dirty="0">
               <a:latin typeface="Bodoni MT" charset="0"/>
-              <a:cs typeface="Helvetica Neue" charset="0"/>
-            </a:endParaRPr>
-          </a:p>
-          <a:p>
-            <a:endParaRPr lang="en-US" dirty="0">
-              <a:latin typeface="Helvetica Neue" charset="0"/>
               <a:cs typeface="Helvetica Neue" charset="0"/>
             </a:endParaRPr>
           </a:p>
@@ -2445,10 +2446,20 @@
           <a:bodyPr/>
           <a:lstStyle/>
           <a:p>
-            <a:endParaRPr lang="en-US" dirty="0">
-              <a:latin typeface="Helvetica Neue" charset="0"/>
-              <a:cs typeface="Helvetica Neue" charset="0"/>
-            </a:endParaRPr>
+            <a:r>
+              <a:rPr lang="en-US" sz="1800" dirty="0">
+                <a:latin typeface="Bodoni MT" charset="0"/>
+              </a:rPr>
+              <a:t>BACKGROUND</a:t>
+            </a:r>
+          </a:p>
+          <a:p>
+            <a:r>
+              <a:rPr lang="en-US" sz="1600" dirty="0">
+                <a:latin typeface="Helvetica Neue" charset="0"/>
+              </a:rPr>
+              <a:t>Packet filters</a:t>
+            </a:r>
           </a:p>
         </p:txBody>
       </p:sp>
@@ -2473,10 +2484,20 @@
           <a:bodyPr/>
           <a:lstStyle/>
           <a:p>
-            <a:endParaRPr lang="en-US">
-              <a:latin typeface="Helvetica Neue" charset="0"/>
-              <a:cs typeface="Helvetica Neue" charset="0"/>
-            </a:endParaRPr>
+            <a:r>
+              <a:rPr lang="en-US" sz="1800" dirty="0">
+                <a:latin typeface="Bodoni MT" charset="0"/>
+              </a:rPr>
+              <a:t>TECHNOLOGIES</a:t>
+            </a:r>
+          </a:p>
+          <a:p>
+            <a:r>
+              <a:rPr lang="en-US" sz="1600" dirty="0">
+                <a:latin typeface="Helvetica Neue" charset="0"/>
+              </a:rPr>
+              <a:t>FPGA</a:t>
+            </a:r>
           </a:p>
         </p:txBody>
       </p:sp>
@@ -2507,6 +2528,38 @@
                 <a:cs typeface="Helvetica Neue" charset="0"/>
               </a:rPr>
               <a:t>RESULTS</a:t>
+            </a:r>
+          </a:p>
+          <a:p>
+            <a:r>
+              <a:rPr lang="en-US">
+                <a:latin typeface="Helvetica Neue" charset="0"/>
+                <a:cs typeface="Helvetica Neue" charset="0"/>
+              </a:rPr>
+              <a:t>4uS </a:t>
+            </a:r>
+            <a:r>
+              <a:rPr lang="en-US" dirty="0">
+                <a:latin typeface="Helvetica Neue" charset="0"/>
+                <a:cs typeface="Helvetica Neue" charset="0"/>
+              </a:rPr>
+              <a:t>of latency added</a:t>
+            </a:r>
+          </a:p>
+          <a:p>
+            <a:r>
+              <a:rPr lang="en-US" dirty="0" err="1">
+                <a:latin typeface="Helvetica Neue" charset="0"/>
+                <a:cs typeface="Helvetica Neue" charset="0"/>
+              </a:rPr>
+              <a:t>Wirespeed</a:t>
+            </a:r>
+            <a:r>
+              <a:rPr lang="en-US" dirty="0">
+                <a:latin typeface="Helvetica Neue" charset="0"/>
+                <a:cs typeface="Helvetica Neue" charset="0"/>
+              </a:rPr>
+              <a:t> </a:t>
             </a:r>
           </a:p>
           <a:p>

</xml_diff>

<commit_message>
Mostly done poster to some extent
</commit_message>
<xml_diff>
--- a/poster/poster_matthew_gilpin.pptx
+++ b/poster/poster_matthew_gilpin.pptx
@@ -2338,8 +2338,8 @@
         </p:blipFill>
         <p:spPr>
           <a:xfrm>
-            <a:off x="10152000" y="5232305"/>
-            <a:ext cx="4356000" cy="3474351"/>
+            <a:off x="7405437" y="3996256"/>
+            <a:ext cx="4167629" cy="3324106"/>
           </a:xfrm>
           <a:prstGeom prst="rect">
             <a:avLst/>
@@ -2372,8 +2372,9 @@
             </a:r>
           </a:p>
           <a:p>
-            <a:r>
-              <a:rPr lang="en-US" sz="1600" dirty="0">
+            <a:pPr algn="just"/>
+            <a:r>
+              <a:rPr lang="en-US" dirty="0">
                 <a:latin typeface="Helvetica Neue" charset="0"/>
                 <a:cs typeface="Helvetica Neue" charset="0"/>
               </a:rPr>
@@ -2381,8 +2382,9 @@
             </a:r>
           </a:p>
           <a:p>
-            <a:r>
-              <a:rPr lang="en-US" sz="1600" dirty="0">
+            <a:pPr algn="just"/>
+            <a:r>
+              <a:rPr lang="en-US" dirty="0">
                 <a:latin typeface="Helvetica Neue" charset="0"/>
                 <a:cs typeface="Helvetica Neue" charset="0"/>
               </a:rPr>
@@ -2390,12 +2392,122 @@
             </a:r>
           </a:p>
           <a:p>
-            <a:r>
-              <a:rPr lang="en-US" sz="1600" dirty="0">
+            <a:pPr algn="just"/>
+            <a:r>
+              <a:rPr lang="en-US" dirty="0">
                 <a:latin typeface="Helvetica Neue" charset="0"/>
                 <a:cs typeface="Helvetica Neue" charset="0"/>
               </a:rPr>
               <a:t>Embedded systems are generally low power and may forgo protection. </a:t>
+            </a:r>
+          </a:p>
+          <a:p>
+            <a:endParaRPr lang="en-US" dirty="0">
+              <a:latin typeface="Helvetica Neue" charset="0"/>
+              <a:cs typeface="Helvetica Neue" charset="0"/>
+            </a:endParaRPr>
+          </a:p>
+          <a:p>
+            <a:pPr algn="just"/>
+            <a:endParaRPr lang="en-US" dirty="0">
+              <a:latin typeface="Helvetica Neue" charset="0"/>
+              <a:cs typeface="Helvetica Neue" charset="0"/>
+            </a:endParaRPr>
+          </a:p>
+          <a:p>
+            <a:pPr algn="just"/>
+            <a:endParaRPr lang="en-US" dirty="0">
+              <a:latin typeface="Helvetica Neue" charset="0"/>
+              <a:cs typeface="Helvetica Neue" charset="0"/>
+            </a:endParaRPr>
+          </a:p>
+          <a:p>
+            <a:pPr algn="just"/>
+            <a:br>
+              <a:rPr lang="en-US" dirty="0">
+                <a:latin typeface="Helvetica Neue" charset="0"/>
+                <a:cs typeface="Helvetica Neue" charset="0"/>
+              </a:rPr>
+            </a:br>
+            <a:r>
+              <a:rPr lang="en-US" dirty="0" err="1">
+                <a:latin typeface="Helvetica Neue" charset="0"/>
+                <a:cs typeface="Helvetica Neue" charset="0"/>
+              </a:rPr>
+              <a:t>Im</a:t>
+            </a:r>
+            <a:r>
+              <a:rPr lang="en-GB" dirty="0" err="1">
+                <a:latin typeface="Helvetica Neue" charset="0"/>
+                <a:cs typeface="Helvetica Neue" charset="0"/>
+              </a:rPr>
+              <a:t>plement</a:t>
+            </a:r>
+            <a:r>
+              <a:rPr lang="en-GB" dirty="0">
+                <a:latin typeface="Helvetica Neue" charset="0"/>
+                <a:cs typeface="Helvetica Neue" charset="0"/>
+              </a:rPr>
+              <a:t> an </a:t>
+            </a:r>
+            <a:r>
+              <a:rPr lang="en-US" dirty="0">
+                <a:latin typeface="Helvetica Neue" charset="0"/>
+                <a:cs typeface="Helvetica Neue" charset="0"/>
+              </a:rPr>
+              <a:t>IPv4-based</a:t>
+            </a:r>
+            <a:r>
+              <a:rPr lang="en-GB" dirty="0">
+                <a:latin typeface="Helvetica Neue" charset="0"/>
+                <a:cs typeface="Helvetica Neue" charset="0"/>
+              </a:rPr>
+              <a:t> hardware firewall with </a:t>
+            </a:r>
+            <a:r>
+              <a:rPr lang="en-US" dirty="0">
+                <a:latin typeface="Helvetica Neue" charset="0"/>
+                <a:cs typeface="Helvetica Neue" charset="0"/>
+              </a:rPr>
+              <a:t>configurable packet filter and web interface.</a:t>
+            </a:r>
+          </a:p>
+          <a:p>
+            <a:pPr algn="just"/>
+            <a:r>
+              <a:rPr lang="en-US" dirty="0">
+                <a:latin typeface="Helvetica Neue" charset="0"/>
+                <a:cs typeface="Helvetica Neue" charset="0"/>
+              </a:rPr>
+              <a:t>Firewall inspects the 5-tuple fields -  </a:t>
+            </a:r>
+            <a:r>
+              <a:rPr lang="en-US" dirty="0" err="1">
+                <a:latin typeface="Helvetica Neue" charset="0"/>
+                <a:cs typeface="Helvetica Neue" charset="0"/>
+              </a:rPr>
+              <a:t>Dest</a:t>
+            </a:r>
+            <a:r>
+              <a:rPr lang="en-US" dirty="0">
+                <a:latin typeface="Helvetica Neue" charset="0"/>
+                <a:cs typeface="Helvetica Neue" charset="0"/>
+              </a:rPr>
+              <a:t>. IP, Source IP, </a:t>
+            </a:r>
+            <a:r>
+              <a:rPr lang="en-US" dirty="0" err="1">
+                <a:latin typeface="Helvetica Neue" charset="0"/>
+                <a:cs typeface="Helvetica Neue" charset="0"/>
+              </a:rPr>
+              <a:t>Dest</a:t>
+            </a:r>
+            <a:r>
+              <a:rPr lang="en-US" dirty="0">
+                <a:latin typeface="Helvetica Neue" charset="0"/>
+                <a:cs typeface="Helvetica Neue" charset="0"/>
+              </a:rPr>
+              <a:t>. Port, Source Port and Protocol.</a:t>
             </a:r>
           </a:p>
           <a:p>
@@ -2406,93 +2518,47 @@
           </a:p>
           <a:p>
             <a:r>
-              <a:rPr lang="en-US" sz="1600" dirty="0">
-                <a:latin typeface="Helvetica Neue" charset="0"/>
-                <a:cs typeface="Helvetica Neue" charset="0"/>
-              </a:rPr>
-              <a:t>Aim: Improve embedded security and decrease latency and power requirements for packet filtering.</a:t>
-            </a:r>
-          </a:p>
-          <a:p>
-            <a:br>
-              <a:rPr lang="en-US" sz="1600" dirty="0">
-                <a:latin typeface="Helvetica Neue" charset="0"/>
-                <a:cs typeface="Helvetica Neue" charset="0"/>
-              </a:rPr>
-            </a:br>
-            <a:r>
-              <a:rPr lang="en-US" sz="1600" dirty="0" err="1">
-                <a:latin typeface="Helvetica Neue" charset="0"/>
-                <a:cs typeface="Helvetica Neue" charset="0"/>
-              </a:rPr>
-              <a:t>Im</a:t>
-            </a:r>
-            <a:r>
-              <a:rPr lang="en-GB" sz="1600" dirty="0" err="1">
-                <a:latin typeface="Helvetica Neue" charset="0"/>
-                <a:cs typeface="Helvetica Neue" charset="0"/>
-              </a:rPr>
-              <a:t>plement</a:t>
-            </a:r>
-            <a:r>
-              <a:rPr lang="en-GB" sz="1600" dirty="0">
-                <a:latin typeface="Helvetica Neue" charset="0"/>
-                <a:cs typeface="Helvetica Neue" charset="0"/>
-              </a:rPr>
-              <a:t> an </a:t>
-            </a:r>
-            <a:r>
-              <a:rPr lang="en-US" sz="1600" dirty="0">
-                <a:latin typeface="Helvetica Neue" charset="0"/>
-                <a:cs typeface="Helvetica Neue" charset="0"/>
-              </a:rPr>
-              <a:t>IPv4-based</a:t>
-            </a:r>
-            <a:r>
-              <a:rPr lang="en-GB" sz="1600" dirty="0">
-                <a:latin typeface="Helvetica Neue" charset="0"/>
-                <a:cs typeface="Helvetica Neue" charset="0"/>
-              </a:rPr>
-              <a:t> hardware firewall with c</a:t>
-            </a:r>
-            <a:r>
-              <a:rPr lang="en-US" sz="1600" dirty="0" err="1">
-                <a:latin typeface="Helvetica Neue" charset="0"/>
-                <a:cs typeface="Helvetica Neue" charset="0"/>
-              </a:rPr>
-              <a:t>onfigurable</a:t>
-            </a:r>
-            <a:r>
-              <a:rPr lang="en-US" sz="1600" dirty="0">
-                <a:latin typeface="Helvetica Neue" charset="0"/>
-                <a:cs typeface="Helvetica Neue" charset="0"/>
-              </a:rPr>
-              <a:t> packet filter and web interface.</a:t>
-            </a:r>
-          </a:p>
-          <a:p>
-            <a:endParaRPr lang="en-US" sz="1600" dirty="0">
+              <a:rPr lang="en-US" sz="1800" dirty="0">
+                <a:latin typeface="Bodoni MT" charset="0"/>
+              </a:rPr>
+              <a:t>BACKGROUND</a:t>
+            </a:r>
+          </a:p>
+          <a:p>
+            <a:pPr algn="just"/>
+            <a:r>
+              <a:rPr lang="en-US" dirty="0">
+                <a:latin typeface="Helvetica Neue" charset="0"/>
+              </a:rPr>
+              <a:t>Firewalls are the first line of </a:t>
+            </a:r>
+            <a:r>
+              <a:rPr lang="en-US" dirty="0" err="1">
+                <a:latin typeface="Helvetica Neue" charset="0"/>
+              </a:rPr>
+              <a:t>defence</a:t>
+            </a:r>
+            <a:r>
+              <a:rPr lang="en-US" dirty="0">
+                <a:latin typeface="Helvetica Neue" charset="0"/>
+              </a:rPr>
+              <a:t> against bad actors by restricting network access to private networks. </a:t>
+            </a:r>
+          </a:p>
+          <a:p>
+            <a:pPr algn="just"/>
+            <a:r>
+              <a:rPr lang="en-US" dirty="0">
+                <a:latin typeface="Helvetica Neue" charset="0"/>
+              </a:rPr>
+              <a:t>Many types of packet filters exist and operate differently. For example deep packet inspection (out of scope). Packet filtering takes place in layers 3 and 4 (Network and Link Layers)</a:t>
+            </a:r>
+          </a:p>
+          <a:p>
+            <a:pPr algn="just"/>
+            <a:endParaRPr lang="en-US" dirty="0">
               <a:latin typeface="Helvetica Neue" charset="0"/>
-              <a:cs typeface="Helvetica Neue" charset="0"/>
-            </a:endParaRPr>
-          </a:p>
-          <a:p>
-            <a:r>
-              <a:rPr lang="en-US" sz="1600" dirty="0">
-                <a:latin typeface="Helvetica Neue" charset="0"/>
-                <a:cs typeface="Helvetica Neue" charset="0"/>
-              </a:rPr>
-              <a:t>Limitations:</a:t>
-            </a:r>
-          </a:p>
-          <a:p>
-            <a:r>
-              <a:rPr lang="en-US" sz="1600" dirty="0">
-                <a:latin typeface="Helvetica Neue" charset="0"/>
-                <a:cs typeface="Helvetica Neue" charset="0"/>
-              </a:rPr>
-              <a:t>Only supporting the 5-tuple fields -  Destination IP, Source IP, Destination Port, Source Port and protocol.</a:t>
-            </a:r>
+            </a:endParaRPr>
           </a:p>
           <a:p>
             <a:endParaRPr lang="en-US" sz="1600" dirty="0">
@@ -2576,116 +2642,63 @@
           </p:nvPr>
         </p:nvSpPr>
         <p:spPr>
+          <a:xfrm>
+            <a:off x="3789482" y="1270000"/>
+            <a:ext cx="3600934" cy="7656512"/>
+          </a:xfrm>
           <a:ln/>
         </p:spPr>
         <p:txBody>
           <a:bodyPr/>
           <a:lstStyle/>
           <a:p>
-            <a:r>
-              <a:rPr lang="en-US" sz="1800" dirty="0">
-                <a:latin typeface="Bodoni MT" charset="0"/>
-              </a:rPr>
-              <a:t>BACKGROUND</a:t>
-            </a:r>
-          </a:p>
-          <a:p>
-            <a:r>
-              <a:rPr lang="en-US" sz="1600" dirty="0">
-                <a:latin typeface="Helvetica Neue" charset="0"/>
-              </a:rPr>
-              <a:t>FPGAs provide a platform to design custom digital logic – great for designs that may change and development. Cheaper and faster turn around time than ASICs in low quantities. </a:t>
-            </a:r>
-          </a:p>
-          <a:p>
-            <a:endParaRPr lang="en-US" sz="1600" dirty="0">
+            <a:pPr algn="just"/>
+            <a:r>
+              <a:rPr lang="en-US" dirty="0"/>
+              <a:t>FPGAs are a class of programmable logic that use lookup tables and flip flops to implement digital logic. Cheaper and faster turn-around time than ASICs in low quantities.</a:t>
+            </a:r>
+          </a:p>
+          <a:p>
+            <a:pPr algn="just"/>
+            <a:r>
+              <a:rPr lang="en-US" dirty="0"/>
+              <a:t> </a:t>
+            </a:r>
+          </a:p>
+          <a:p>
+            <a:pPr algn="just"/>
+            <a:r>
+              <a:rPr lang="en-US" dirty="0"/>
+              <a:t>FPGA allow for complete control over data and hardware </a:t>
+            </a:r>
+            <a:r>
+              <a:rPr lang="en-US" dirty="0" err="1"/>
+              <a:t>parallelisation</a:t>
+            </a:r>
+            <a:r>
+              <a:rPr lang="en-US" dirty="0"/>
+              <a:t>. Can design lower latency hardware. </a:t>
+            </a:r>
+          </a:p>
+          <a:p>
+            <a:endParaRPr lang="en-US" dirty="0">
               <a:latin typeface="Helvetica Neue" charset="0"/>
             </a:endParaRPr>
           </a:p>
           <a:p>
-            <a:r>
-              <a:rPr lang="en-US" sz="1600" dirty="0">
-                <a:latin typeface="Helvetica Neue" charset="0"/>
-              </a:rPr>
-              <a:t>FPGA allow for complete control over data and hardware. Can design lower latency hardware. </a:t>
-            </a:r>
-          </a:p>
-          <a:p>
-            <a:endParaRPr lang="en-US" sz="1600" dirty="0">
+            <a:pPr algn="just"/>
+            <a:r>
+              <a:rPr lang="en-US" dirty="0">
+                <a:latin typeface="Helvetica Neue" charset="0"/>
+              </a:rPr>
+              <a:t>Previous papers achieved a latency of 61.266us with 5-typle binding packet filter on FPGA. Goal: achieve lower latency.</a:t>
+            </a:r>
+          </a:p>
+          <a:p>
+            <a:pPr algn="just"/>
+            <a:endParaRPr lang="en-US" dirty="0">
               <a:latin typeface="Helvetica Neue" charset="0"/>
             </a:endParaRPr>
-          </a:p>
-          <a:p>
-            <a:r>
-              <a:rPr lang="en-US" sz="1600" dirty="0">
-                <a:latin typeface="Helvetica Neue" charset="0"/>
-              </a:rPr>
-              <a:t>Previous papers achieved a latency of 61.266us with 5-typle binding packet filter on FPGA.</a:t>
-            </a:r>
-          </a:p>
-          <a:p>
-            <a:endParaRPr lang="en-US" sz="1600" dirty="0">
-              <a:latin typeface="Helvetica Neue" charset="0"/>
-            </a:endParaRPr>
-          </a:p>
-          <a:p>
-            <a:r>
-              <a:rPr lang="en-US" sz="1600" dirty="0">
-                <a:latin typeface="Helvetica Neue" charset="0"/>
-              </a:rPr>
-              <a:t>Many packet filters exist and filter differently, some do deep packet inspection (out of scope)</a:t>
-            </a:r>
-          </a:p>
-          <a:p>
-            <a:endParaRPr lang="en-US" sz="1600" dirty="0">
-              <a:latin typeface="Helvetica Neue" charset="0"/>
-            </a:endParaRPr>
-          </a:p>
-          <a:p>
-            <a:r>
-              <a:rPr lang="en-US" sz="1600" dirty="0">
-                <a:latin typeface="Helvetica Neue" charset="0"/>
-              </a:rPr>
-              <a:t>Packet filters can be implemented in many ways to save resources, but slower.</a:t>
-            </a:r>
-          </a:p>
-          <a:p>
-            <a:endParaRPr lang="en-US" sz="1600" dirty="0">
-              <a:latin typeface="Helvetica Neue" charset="0"/>
-            </a:endParaRPr>
-          </a:p>
-          <a:p>
-            <a:r>
-              <a:rPr lang="en-US" sz="1600" dirty="0">
-                <a:latin typeface="Helvetica Neue" charset="0"/>
-              </a:rPr>
-              <a:t>Networks are hierarchical and are layered based. Layer 1 – Physical interface, Layer 2 - Link Layer, Layer 3 – Network Layer, Layer 4 – Transport Layer, Layer 5+ Application Layer.. Packet filtering typically happens in layer 3 and 4.</a:t>
-            </a:r>
-          </a:p>
-          <a:p>
-            <a:endParaRPr lang="en-US" sz="1600" dirty="0">
-              <a:latin typeface="Helvetica Neue" charset="0"/>
-            </a:endParaRPr>
-          </a:p>
-          <a:p>
-            <a:r>
-              <a:rPr lang="en-US" sz="1600" dirty="0">
-                <a:latin typeface="Helvetica Neue" charset="0"/>
-              </a:rPr>
-              <a:t>Hardware support allows for </a:t>
-            </a:r>
-            <a:r>
-              <a:rPr lang="en-US" sz="1600" dirty="0" err="1">
-                <a:latin typeface="Helvetica Neue" charset="0"/>
-              </a:rPr>
-              <a:t>wirespeed</a:t>
-            </a:r>
-            <a:r>
-              <a:rPr lang="en-US" sz="1600" dirty="0">
-                <a:latin typeface="Helvetica Neue" charset="0"/>
-              </a:rPr>
-              <a:t> throughput with the lowest latency. </a:t>
-            </a:r>
           </a:p>
         </p:txBody>
       </p:sp>
@@ -2700,6 +2713,10 @@
           </p:nvPr>
         </p:nvSpPr>
         <p:spPr>
+          <a:xfrm>
+            <a:off x="7449101" y="1270000"/>
+            <a:ext cx="3694267" cy="7656512"/>
+          </a:xfrm>
           <a:ln/>
         </p:spPr>
         <p:txBody>
@@ -2714,177 +2731,233 @@
             </a:r>
           </a:p>
           <a:p>
-            <a:r>
-              <a:rPr lang="en-US" sz="1600" dirty="0">
-                <a:latin typeface="Helvetica Neue" charset="0"/>
-              </a:rPr>
-              <a:t>Xilinx </a:t>
-            </a:r>
-            <a:r>
-              <a:rPr lang="en-US" sz="1600" dirty="0" err="1">
+            <a:pPr algn="just"/>
+            <a:r>
+              <a:rPr lang="en-US" dirty="0" err="1">
+                <a:latin typeface="Helvetica Neue" charset="0"/>
+              </a:rPr>
+              <a:t>Digilent</a:t>
+            </a:r>
+            <a:r>
+              <a:rPr lang="en-US" dirty="0">
+                <a:latin typeface="Helvetica Neue" charset="0"/>
+              </a:rPr>
+              <a:t> </a:t>
+            </a:r>
+            <a:r>
+              <a:rPr lang="en-US" dirty="0" err="1">
+                <a:latin typeface="Helvetica Neue" charset="0"/>
+              </a:rPr>
+              <a:t>Nexys</a:t>
+            </a:r>
+            <a:r>
+              <a:rPr lang="en-US" dirty="0">
+                <a:latin typeface="Helvetica Neue" charset="0"/>
+              </a:rPr>
+              <a:t> A7 </a:t>
+            </a:r>
+          </a:p>
+          <a:p>
+            <a:pPr algn="just"/>
+            <a:r>
+              <a:rPr lang="en-US" dirty="0">
+                <a:latin typeface="Helvetica Neue" charset="0"/>
+              </a:rPr>
+              <a:t>  - Xilinx </a:t>
+            </a:r>
+            <a:r>
+              <a:rPr lang="en-US" dirty="0" err="1">
                 <a:latin typeface="Helvetica Neue" charset="0"/>
               </a:rPr>
               <a:t>Artix</a:t>
             </a:r>
             <a:r>
-              <a:rPr lang="en-US" sz="1600" dirty="0">
+              <a:rPr lang="en-US" dirty="0">
                 <a:latin typeface="Helvetica Neue" charset="0"/>
               </a:rPr>
               <a:t> 7 100T FPGA.</a:t>
             </a:r>
           </a:p>
           <a:p>
-            <a:endParaRPr lang="en-US" sz="1600" dirty="0">
+            <a:pPr algn="just"/>
+            <a:r>
+              <a:rPr lang="en-US" dirty="0">
+                <a:latin typeface="Helvetica Neue" charset="0"/>
+              </a:rPr>
+              <a:t>  - LAN8720A RMII PHY</a:t>
+            </a:r>
+          </a:p>
+          <a:p>
+            <a:pPr algn="just"/>
+            <a:br>
+              <a:rPr lang="en-US" dirty="0">
+                <a:latin typeface="Helvetica Neue" charset="0"/>
+              </a:rPr>
+            </a:br>
+            <a:r>
+              <a:rPr lang="en-US" dirty="0">
+                <a:latin typeface="Helvetica Neue" charset="0"/>
+              </a:rPr>
+              <a:t>NEORV32 RISC-V softcore at 80Mhz</a:t>
+            </a:r>
+          </a:p>
+          <a:p>
+            <a:pPr algn="just"/>
+            <a:r>
+              <a:rPr lang="en-US" dirty="0">
+                <a:latin typeface="Helvetica Neue" charset="0"/>
+              </a:rPr>
+              <a:t>Ethernet Controller over Wishbone Classic</a:t>
+            </a:r>
+          </a:p>
+          <a:p>
+            <a:pPr algn="just"/>
+            <a:r>
+              <a:rPr lang="en-US" dirty="0">
+                <a:latin typeface="Helvetica Neue" charset="0"/>
+              </a:rPr>
+              <a:t>    - Written from the ground up</a:t>
+            </a:r>
+          </a:p>
+          <a:p>
+            <a:pPr algn="just"/>
+            <a:r>
+              <a:rPr lang="en-US" dirty="0">
+                <a:latin typeface="Helvetica Neue" charset="0"/>
+              </a:rPr>
+              <a:t>    - 32bits wide memory mapped.</a:t>
+            </a:r>
+          </a:p>
+          <a:p>
+            <a:pPr algn="just"/>
+            <a:r>
+              <a:rPr lang="en-US" dirty="0">
+                <a:latin typeface="Helvetica Neue" charset="0"/>
+              </a:rPr>
+              <a:t>    - computes CRC32 on the fly</a:t>
+            </a:r>
+          </a:p>
+          <a:p>
+            <a:pPr algn="just"/>
+            <a:endParaRPr lang="en-US" dirty="0">
               <a:latin typeface="Helvetica Neue" charset="0"/>
             </a:endParaRPr>
           </a:p>
           <a:p>
-            <a:r>
-              <a:rPr lang="en-US" sz="1600" dirty="0">
-                <a:latin typeface="Helvetica Neue" charset="0"/>
-              </a:rPr>
-              <a:t>NEORV32 RISC-V softcore</a:t>
-            </a:r>
-          </a:p>
-          <a:p>
-            <a:endParaRPr lang="en-US" sz="1600" dirty="0">
+            <a:pPr algn="just"/>
+            <a:endParaRPr lang="en-US" dirty="0">
               <a:latin typeface="Helvetica Neue" charset="0"/>
             </a:endParaRPr>
           </a:p>
           <a:p>
-            <a:r>
-              <a:rPr lang="en-US" sz="1600" dirty="0">
-                <a:latin typeface="Helvetica Neue" charset="0"/>
-              </a:rPr>
-              <a:t>LAN8720A RMII PHY</a:t>
-            </a:r>
-          </a:p>
-          <a:p>
-            <a:endParaRPr lang="en-US" sz="1600" dirty="0">
+            <a:pPr algn="just"/>
+            <a:endParaRPr lang="en-US" dirty="0">
               <a:latin typeface="Helvetica Neue" charset="0"/>
             </a:endParaRPr>
           </a:p>
           <a:p>
-            <a:r>
-              <a:rPr lang="en-US" sz="1600" dirty="0">
-                <a:latin typeface="Helvetica Neue" charset="0"/>
-              </a:rPr>
-              <a:t>MAC over </a:t>
-            </a:r>
-            <a:r>
-              <a:rPr lang="en-US" sz="1600" dirty="0" err="1">
-                <a:latin typeface="Helvetica Neue" charset="0"/>
-              </a:rPr>
-              <a:t>Wisbone</a:t>
-            </a:r>
-            <a:r>
-              <a:rPr lang="en-US" sz="1600" dirty="0">
-                <a:latin typeface="Helvetica Neue" charset="0"/>
-              </a:rPr>
-              <a:t> B4 Classic</a:t>
-            </a:r>
-          </a:p>
-          <a:p>
-            <a:r>
-              <a:rPr lang="en-US" sz="1600" dirty="0">
-                <a:latin typeface="Helvetica Neue" charset="0"/>
-              </a:rPr>
-              <a:t>    - Written from the ground up</a:t>
-            </a:r>
-          </a:p>
-          <a:p>
-            <a:r>
-              <a:rPr lang="en-US" sz="1600" dirty="0">
-                <a:latin typeface="Helvetica Neue" charset="0"/>
-              </a:rPr>
-              <a:t>    - 32bits wide memory mapped.</a:t>
-            </a:r>
-          </a:p>
-          <a:p>
-            <a:r>
-              <a:rPr lang="en-US" sz="1600" dirty="0">
-                <a:latin typeface="Helvetica Neue" charset="0"/>
-              </a:rPr>
-              <a:t>    - computes CRC32 on the fly</a:t>
-            </a:r>
-          </a:p>
-          <a:p>
-            <a:endParaRPr lang="en-US" sz="1600" dirty="0">
+            <a:pPr algn="just"/>
+            <a:endParaRPr lang="en-US" dirty="0">
               <a:latin typeface="Helvetica Neue" charset="0"/>
             </a:endParaRPr>
           </a:p>
           <a:p>
-            <a:r>
-              <a:rPr lang="en-US" sz="1600" dirty="0">
-                <a:latin typeface="Helvetica Neue" charset="0"/>
-              </a:rPr>
-              <a:t>Hardware packet filter supports currently 8 rules and does parallel comparisons on all 8 rules at a time. </a:t>
-            </a:r>
-          </a:p>
-          <a:p>
-            <a:r>
-              <a:rPr lang="en-US" sz="1600" dirty="0">
-                <a:latin typeface="Helvetica Neue" charset="0"/>
-              </a:rPr>
-              <a:t>Hardware filtering takes place at the RMII level. </a:t>
-            </a:r>
-          </a:p>
-          <a:p>
-            <a:endParaRPr lang="en-US" sz="1600" dirty="0">
+            <a:pPr algn="just"/>
+            <a:endParaRPr lang="en-US" dirty="0">
               <a:latin typeface="Helvetica Neue" charset="0"/>
             </a:endParaRPr>
           </a:p>
           <a:p>
-            <a:r>
-              <a:rPr lang="en-US" sz="1600" dirty="0" err="1">
+            <a:pPr algn="just"/>
+            <a:endParaRPr lang="en-US" dirty="0">
+              <a:latin typeface="Helvetica Neue" charset="0"/>
+            </a:endParaRPr>
+          </a:p>
+          <a:p>
+            <a:pPr algn="just"/>
+            <a:endParaRPr lang="en-US" dirty="0">
+              <a:latin typeface="Helvetica Neue" charset="0"/>
+            </a:endParaRPr>
+          </a:p>
+          <a:p>
+            <a:pPr algn="just"/>
+            <a:endParaRPr lang="en-US" dirty="0">
+              <a:latin typeface="Helvetica Neue" charset="0"/>
+            </a:endParaRPr>
+          </a:p>
+          <a:p>
+            <a:pPr algn="just"/>
+            <a:endParaRPr lang="en-US" dirty="0">
+              <a:latin typeface="Helvetica Neue" charset="0"/>
+            </a:endParaRPr>
+          </a:p>
+          <a:p>
+            <a:pPr algn="just"/>
+            <a:endParaRPr lang="en-US" dirty="0">
+              <a:latin typeface="Helvetica Neue" charset="0"/>
+            </a:endParaRPr>
+          </a:p>
+          <a:p>
+            <a:pPr algn="just"/>
+            <a:endParaRPr lang="en-US" dirty="0">
+              <a:latin typeface="Helvetica Neue" charset="0"/>
+            </a:endParaRPr>
+          </a:p>
+          <a:p>
+            <a:pPr algn="just"/>
+            <a:endParaRPr lang="en-US" dirty="0">
+              <a:latin typeface="Helvetica Neue" charset="0"/>
+            </a:endParaRPr>
+          </a:p>
+          <a:p>
+            <a:pPr algn="just"/>
+            <a:endParaRPr lang="en-US" dirty="0">
+              <a:latin typeface="Helvetica Neue" charset="0"/>
+            </a:endParaRPr>
+          </a:p>
+          <a:p>
+            <a:pPr algn="just"/>
+            <a:endParaRPr lang="en-US" dirty="0">
+              <a:latin typeface="Helvetica Neue" charset="0"/>
+            </a:endParaRPr>
+          </a:p>
+          <a:p>
+            <a:pPr algn="just"/>
+            <a:endParaRPr lang="en-US" dirty="0">
+              <a:latin typeface="Helvetica Neue" charset="0"/>
+            </a:endParaRPr>
+          </a:p>
+          <a:p>
+            <a:pPr algn="just"/>
+            <a:endParaRPr lang="en-US" dirty="0">
+              <a:latin typeface="Helvetica Neue" charset="0"/>
+            </a:endParaRPr>
+          </a:p>
+          <a:p>
+            <a:pPr algn="just"/>
+            <a:endParaRPr lang="en-US" dirty="0">
+              <a:latin typeface="Helvetica Neue" charset="0"/>
+            </a:endParaRPr>
+          </a:p>
+          <a:p>
+            <a:pPr algn="just"/>
+            <a:r>
+              <a:rPr lang="en-US" dirty="0" err="1">
                 <a:latin typeface="Helvetica Neue" charset="0"/>
               </a:rPr>
               <a:t>FreeRTOS</a:t>
             </a:r>
             <a:r>
-              <a:rPr lang="en-US" sz="1600" dirty="0">
+              <a:rPr lang="en-US" dirty="0">
                 <a:latin typeface="Helvetica Neue" charset="0"/>
               </a:rPr>
               <a:t>-Plus-TCP handles layer 3 and up including webserver.</a:t>
             </a:r>
           </a:p>
           <a:p>
-            <a:endParaRPr lang="en-US" sz="1600" dirty="0">
+            <a:endParaRPr lang="en-US" dirty="0">
               <a:latin typeface="Helvetica Neue" charset="0"/>
             </a:endParaRPr>
-          </a:p>
-          <a:p>
-            <a:r>
-              <a:rPr lang="en-US" sz="1600" dirty="0">
-                <a:latin typeface="Helvetica Neue" charset="0"/>
-              </a:rPr>
-              <a:t>Webapp designed in Vue.js with </a:t>
-            </a:r>
-            <a:r>
-              <a:rPr lang="en-US" sz="1600" dirty="0" err="1">
-                <a:latin typeface="Helvetica Neue" charset="0"/>
-              </a:rPr>
-              <a:t>Tailwindcss</a:t>
-            </a:r>
-            <a:r>
-              <a:rPr lang="en-US" sz="1600" dirty="0">
-                <a:latin typeface="Helvetica Neue" charset="0"/>
-              </a:rPr>
-              <a:t> for styling. Static single page application – Less network traffic </a:t>
-            </a:r>
-          </a:p>
-          <a:p>
-            <a:endParaRPr lang="en-US" sz="1600" dirty="0">
-              <a:latin typeface="Helvetica Neue" charset="0"/>
-            </a:endParaRPr>
-          </a:p>
-          <a:p>
-            <a:r>
-              <a:rPr lang="en-US" sz="1600" dirty="0">
-                <a:latin typeface="Helvetica Neue" charset="0"/>
-              </a:rPr>
-              <a:t>Webapp uses REST API  </a:t>
-            </a:r>
           </a:p>
           <a:p>
             <a:endParaRPr lang="en-US" sz="1600" dirty="0">
@@ -2911,6 +2984,32 @@
           <a:lstStyle/>
           <a:p>
             <a:r>
+              <a:rPr lang="en-US" dirty="0">
+                <a:latin typeface="Helvetica Neue" charset="0"/>
+              </a:rPr>
+              <a:t>Webapp designed in Vue.js with </a:t>
+            </a:r>
+            <a:r>
+              <a:rPr lang="en-US" dirty="0" err="1">
+                <a:latin typeface="Helvetica Neue" charset="0"/>
+              </a:rPr>
+              <a:t>Tailwindcss</a:t>
+            </a:r>
+            <a:r>
+              <a:rPr lang="en-US" dirty="0">
+                <a:latin typeface="Helvetica Neue" charset="0"/>
+              </a:rPr>
+              <a:t> for styling. Static single page application – Less network traffic. Uses RESTful API for data.</a:t>
+            </a:r>
+          </a:p>
+          <a:p>
+            <a:endParaRPr lang="en-US" sz="1800" dirty="0">
+              <a:latin typeface="Bodoni MT" charset="0"/>
+              <a:cs typeface="Helvetica Neue" charset="0"/>
+            </a:endParaRPr>
+          </a:p>
+          <a:p>
+            <a:r>
               <a:rPr lang="en-US" sz="1800" dirty="0">
                 <a:latin typeface="Bodoni MT" charset="0"/>
                 <a:cs typeface="Helvetica Neue" charset="0"/>
@@ -2920,36 +3019,117 @@
           </a:p>
           <a:p>
             <a:r>
+              <a:rPr lang="en-US" dirty="0" err="1">
+                <a:latin typeface="Helvetica Neue" charset="0"/>
+                <a:cs typeface="Helvetica Neue" charset="0"/>
+              </a:rPr>
+              <a:t>Wirespeed</a:t>
+            </a:r>
+            <a:r>
               <a:rPr lang="en-US" dirty="0">
                 <a:latin typeface="Helvetica Neue" charset="0"/>
                 <a:cs typeface="Helvetica Neue" charset="0"/>
               </a:rPr>
+              <a:t> – 100Mbit/s</a:t>
+            </a:r>
+          </a:p>
+          <a:p>
+            <a:r>
+              <a:rPr lang="en-US" dirty="0">
+                <a:latin typeface="Helvetica Neue" charset="0"/>
+                <a:cs typeface="Helvetica Neue" charset="0"/>
+              </a:rPr>
               <a:t>4uS of latency added</a:t>
             </a:r>
           </a:p>
           <a:p>
-            <a:r>
-              <a:rPr lang="en-US" dirty="0" err="1">
+            <a:endParaRPr lang="en-US" dirty="0">
+              <a:latin typeface="Helvetica Neue" charset="0"/>
+              <a:cs typeface="Helvetica Neue" charset="0"/>
+            </a:endParaRPr>
+          </a:p>
+          <a:p>
+            <a:endParaRPr lang="en-US" dirty="0">
+              <a:latin typeface="Helvetica Neue" charset="0"/>
+              <a:cs typeface="Helvetica Neue" charset="0"/>
+            </a:endParaRPr>
+          </a:p>
+          <a:p>
+            <a:endParaRPr lang="en-US" dirty="0">
+              <a:latin typeface="Helvetica Neue" charset="0"/>
+              <a:cs typeface="Helvetica Neue" charset="0"/>
+            </a:endParaRPr>
+          </a:p>
+          <a:p>
+            <a:endParaRPr lang="en-US" dirty="0">
+              <a:latin typeface="Helvetica Neue" charset="0"/>
+              <a:cs typeface="Helvetica Neue" charset="0"/>
+            </a:endParaRPr>
+          </a:p>
+          <a:p>
+            <a:endParaRPr lang="en-US" dirty="0">
+              <a:latin typeface="Helvetica Neue" charset="0"/>
+              <a:cs typeface="Helvetica Neue" charset="0"/>
+            </a:endParaRPr>
+          </a:p>
+          <a:p>
+            <a:endParaRPr lang="en-US" dirty="0">
+              <a:latin typeface="Helvetica Neue" charset="0"/>
+              <a:cs typeface="Helvetica Neue" charset="0"/>
+            </a:endParaRPr>
+          </a:p>
+          <a:p>
+            <a:endParaRPr lang="en-US" dirty="0">
+              <a:latin typeface="Helvetica Neue" charset="0"/>
+              <a:cs typeface="Helvetica Neue" charset="0"/>
+            </a:endParaRPr>
+          </a:p>
+          <a:p>
+            <a:endParaRPr lang="en-US" dirty="0">
+              <a:latin typeface="Helvetica Neue" charset="0"/>
+              <a:cs typeface="Helvetica Neue" charset="0"/>
+            </a:endParaRPr>
+          </a:p>
+          <a:p>
+            <a:r>
+              <a:rPr lang="en-US" dirty="0">
                 <a:latin typeface="Helvetica Neue" charset="0"/>
                 <a:cs typeface="Helvetica Neue" charset="0"/>
               </a:rPr>
-              <a:t>Wirespeed</a:t>
-            </a:r>
+              <a:t>Measured 0.51W power consumption</a:t>
+            </a:r>
+          </a:p>
+          <a:p>
+            <a:endParaRPr lang="en-US" dirty="0">
+              <a:latin typeface="Helvetica Neue" charset="0"/>
+              <a:cs typeface="Helvetica Neue" charset="0"/>
+            </a:endParaRPr>
+          </a:p>
+          <a:p>
+            <a:endParaRPr lang="en-US" dirty="0">
+              <a:latin typeface="Helvetica Neue" charset="0"/>
+              <a:cs typeface="Helvetica Neue" charset="0"/>
+            </a:endParaRPr>
+          </a:p>
+          <a:p>
+            <a:endParaRPr lang="en-US" dirty="0">
+              <a:latin typeface="Helvetica Neue" charset="0"/>
+              <a:cs typeface="Helvetica Neue" charset="0"/>
+            </a:endParaRPr>
+          </a:p>
+          <a:p>
+            <a:endParaRPr lang="en-US" dirty="0">
+              <a:latin typeface="Helvetica Neue" charset="0"/>
+              <a:cs typeface="Helvetica Neue" charset="0"/>
+            </a:endParaRPr>
+          </a:p>
+          <a:p>
             <a:r>
               <a:rPr lang="en-US" dirty="0">
                 <a:latin typeface="Helvetica Neue" charset="0"/>
                 <a:cs typeface="Helvetica Neue" charset="0"/>
               </a:rPr>
-              <a:t> – 100Mbit/s</a:t>
-            </a:r>
-          </a:p>
-          <a:p>
-            <a:r>
-              <a:rPr lang="en-US" dirty="0">
-                <a:latin typeface="Helvetica Neue" charset="0"/>
-                <a:cs typeface="Helvetica Neue" charset="0"/>
-              </a:rPr>
-              <a:t>Measured 0.51W power consumption</a:t>
+              <a:t>Comparable to other platforms. Gap in the different size packets indicates limitation of CPU power.</a:t>
             </a:r>
           </a:p>
           <a:p>
@@ -2974,46 +3154,15 @@
           </p:cNvPicPr>
           <p:nvPr/>
         </p:nvPicPr>
-        <p:blipFill>
+        <p:blipFill rotWithShape="1">
           <a:blip r:embed="rId3"/>
-          <a:stretch>
-            <a:fillRect/>
-          </a:stretch>
+          <a:srcRect t="7375" b="7192"/>
+          <a:stretch/>
         </p:blipFill>
         <p:spPr>
           <a:xfrm>
-            <a:off x="10793650" y="2355185"/>
-            <a:ext cx="3008750" cy="2435795"/>
-          </a:xfrm>
-          <a:prstGeom prst="rect">
-            <a:avLst/>
-          </a:prstGeom>
-        </p:spPr>
-      </p:pic>
-      <p:pic>
-        <p:nvPicPr>
-          <p:cNvPr id="11" name="Picture 10" descr="A screenshot of a computer&#10;&#10;Description automatically generated">
-            <a:extLst>
-              <a:ext uri="{FF2B5EF4-FFF2-40B4-BE49-F238E27FC236}">
-                <a16:creationId xmlns:a16="http://schemas.microsoft.com/office/drawing/2014/main" id="{AD421B88-58A7-B754-839B-8AA4BF6E8866}"/>
-              </a:ext>
-            </a:extLst>
-          </p:cNvPr>
-          <p:cNvPicPr>
-            <a:picLocks noChangeAspect="1"/>
-          </p:cNvPicPr>
-          <p:nvPr/>
-        </p:nvPicPr>
-        <p:blipFill>
-          <a:blip r:embed="rId4"/>
-          <a:stretch>
-            <a:fillRect/>
-          </a:stretch>
-        </p:blipFill>
-        <p:spPr>
-          <a:xfrm>
-            <a:off x="11702069" y="2709350"/>
-            <a:ext cx="3662257" cy="4163260"/>
+            <a:off x="11689030" y="3546263"/>
+            <a:ext cx="2637007" cy="1823844"/>
           </a:xfrm>
           <a:prstGeom prst="rect">
             <a:avLst/>
@@ -3035,15 +3184,15 @@
           <p:nvPr/>
         </p:nvPicPr>
         <p:blipFill>
-          <a:blip r:embed="rId5"/>
+          <a:blip r:embed="rId4"/>
           <a:stretch>
             <a:fillRect/>
           </a:stretch>
         </p:blipFill>
         <p:spPr>
           <a:xfrm>
-            <a:off x="9969052" y="7872622"/>
-            <a:ext cx="5395274" cy="2691105"/>
+            <a:off x="11361223" y="7437135"/>
+            <a:ext cx="3064022" cy="1528301"/>
           </a:xfrm>
           <a:prstGeom prst="rect">
             <a:avLst/>
@@ -3065,6 +3214,225 @@
           <p:nvPr/>
         </p:nvPicPr>
         <p:blipFill>
+          <a:blip r:embed="rId5"/>
+          <a:stretch>
+            <a:fillRect/>
+          </a:stretch>
+        </p:blipFill>
+        <p:spPr>
+          <a:xfrm>
+            <a:off x="12053110" y="5883669"/>
+            <a:ext cx="1481831" cy="799027"/>
+          </a:xfrm>
+          <a:prstGeom prst="rect">
+            <a:avLst/>
+          </a:prstGeom>
+        </p:spPr>
+      </p:pic>
+      <p:sp>
+        <p:nvSpPr>
+          <p:cNvPr id="17" name="TextBox 16">
+            <a:extLst>
+              <a:ext uri="{FF2B5EF4-FFF2-40B4-BE49-F238E27FC236}">
+                <a16:creationId xmlns:a16="http://schemas.microsoft.com/office/drawing/2014/main" id="{3C598080-7231-AC76-0BCF-20F9A375CFE3}"/>
+              </a:ext>
+            </a:extLst>
+          </p:cNvPr>
+          <p:cNvSpPr txBox="1"/>
+          <p:nvPr/>
+        </p:nvSpPr>
+        <p:spPr>
+          <a:xfrm>
+            <a:off x="236742" y="3120615"/>
+            <a:ext cx="3251322" cy="851297"/>
+          </a:xfrm>
+          <a:prstGeom prst="roundRect">
+            <a:avLst/>
+          </a:prstGeom>
+          <a:solidFill>
+            <a:srgbClr val="3D3092"/>
+          </a:solidFill>
+        </p:spPr>
+        <p:txBody>
+          <a:bodyPr wrap="square" rtlCol="0">
+            <a:spAutoFit/>
+          </a:bodyPr>
+          <a:lstStyle/>
+          <a:p>
+            <a:r>
+              <a:rPr lang="en-US" sz="1600" b="1" dirty="0">
+                <a:solidFill>
+                  <a:schemeClr val="bg1"/>
+                </a:solidFill>
+                <a:latin typeface="Helvetica Neue" charset="0"/>
+              </a:rPr>
+              <a:t>Aim</a:t>
+            </a:r>
+            <a:r>
+              <a:rPr lang="en-US" sz="1400" dirty="0">
+                <a:solidFill>
+                  <a:schemeClr val="bg1"/>
+                </a:solidFill>
+                <a:latin typeface="Helvetica Neue" charset="0"/>
+              </a:rPr>
+              <a:t>: Improve embedded security while decreasing latency and power requirements for packet filtering.</a:t>
+            </a:r>
+          </a:p>
+        </p:txBody>
+      </p:sp>
+      <p:sp>
+        <p:nvSpPr>
+          <p:cNvPr id="18" name="TextBox 17">
+            <a:extLst>
+              <a:ext uri="{FF2B5EF4-FFF2-40B4-BE49-F238E27FC236}">
+                <a16:creationId xmlns:a16="http://schemas.microsoft.com/office/drawing/2014/main" id="{514662BC-C17B-FB2D-6E39-EFC4C22B89FC}"/>
+              </a:ext>
+            </a:extLst>
+          </p:cNvPr>
+          <p:cNvSpPr txBox="1"/>
+          <p:nvPr/>
+        </p:nvSpPr>
+        <p:spPr>
+          <a:xfrm>
+            <a:off x="236742" y="7973378"/>
+            <a:ext cx="3251322" cy="851297"/>
+          </a:xfrm>
+          <a:prstGeom prst="roundRect">
+            <a:avLst/>
+          </a:prstGeom>
+          <a:solidFill>
+            <a:srgbClr val="3D3092"/>
+          </a:solidFill>
+        </p:spPr>
+        <p:txBody>
+          <a:bodyPr wrap="square" rtlCol="0">
+            <a:spAutoFit/>
+          </a:bodyPr>
+          <a:lstStyle/>
+          <a:p>
+            <a:r>
+              <a:rPr lang="en-US" sz="1600" b="1" dirty="0">
+                <a:solidFill>
+                  <a:schemeClr val="bg1"/>
+                </a:solidFill>
+                <a:latin typeface="Helvetica Neue" charset="0"/>
+              </a:rPr>
+              <a:t>Key</a:t>
+            </a:r>
+            <a:r>
+              <a:rPr lang="en-US" sz="1400" dirty="0">
+                <a:solidFill>
+                  <a:schemeClr val="bg1"/>
+                </a:solidFill>
+                <a:latin typeface="Helvetica Neue" charset="0"/>
+              </a:rPr>
+              <a:t>: Filtering in hardware allows for </a:t>
+            </a:r>
+            <a:r>
+              <a:rPr lang="en-US" sz="1400" dirty="0" err="1">
+                <a:solidFill>
+                  <a:schemeClr val="bg1"/>
+                </a:solidFill>
+                <a:latin typeface="Helvetica Neue" charset="0"/>
+              </a:rPr>
+              <a:t>wirespeed</a:t>
+            </a:r>
+            <a:r>
+              <a:rPr lang="en-US" sz="1400" dirty="0">
+                <a:solidFill>
+                  <a:schemeClr val="bg1"/>
+                </a:solidFill>
+                <a:latin typeface="Helvetica Neue" charset="0"/>
+              </a:rPr>
+              <a:t> throughput with low latency due to </a:t>
+            </a:r>
+            <a:r>
+              <a:rPr lang="en-US" sz="1400" dirty="0" err="1">
+                <a:solidFill>
+                  <a:schemeClr val="bg1"/>
+                </a:solidFill>
+                <a:latin typeface="Helvetica Neue" charset="0"/>
+              </a:rPr>
+              <a:t>parallelisation</a:t>
+            </a:r>
+            <a:r>
+              <a:rPr lang="en-US" sz="1400" dirty="0">
+                <a:solidFill>
+                  <a:schemeClr val="bg1"/>
+                </a:solidFill>
+                <a:latin typeface="Helvetica Neue" charset="0"/>
+              </a:rPr>
+              <a:t>. </a:t>
+            </a:r>
+          </a:p>
+        </p:txBody>
+      </p:sp>
+      <p:sp>
+        <p:nvSpPr>
+          <p:cNvPr id="20" name="TextBox 19">
+            <a:extLst>
+              <a:ext uri="{FF2B5EF4-FFF2-40B4-BE49-F238E27FC236}">
+                <a16:creationId xmlns:a16="http://schemas.microsoft.com/office/drawing/2014/main" id="{47B4E530-73EA-509A-6DB5-3F4F8D3A5F2A}"/>
+              </a:ext>
+            </a:extLst>
+          </p:cNvPr>
+          <p:cNvSpPr txBox="1"/>
+          <p:nvPr/>
+        </p:nvSpPr>
+        <p:spPr>
+          <a:xfrm>
+            <a:off x="7567629" y="7510503"/>
+            <a:ext cx="3251322" cy="612934"/>
+          </a:xfrm>
+          <a:prstGeom prst="roundRect">
+            <a:avLst/>
+          </a:prstGeom>
+          <a:solidFill>
+            <a:srgbClr val="3D3092"/>
+          </a:solidFill>
+        </p:spPr>
+        <p:txBody>
+          <a:bodyPr wrap="square" rtlCol="0">
+            <a:spAutoFit/>
+          </a:bodyPr>
+          <a:lstStyle/>
+          <a:p>
+            <a:r>
+              <a:rPr lang="en-US" sz="1600" b="1" dirty="0">
+                <a:solidFill>
+                  <a:schemeClr val="bg1"/>
+                </a:solidFill>
+                <a:latin typeface="Helvetica Neue" charset="0"/>
+              </a:rPr>
+              <a:t>Key</a:t>
+            </a:r>
+            <a:r>
+              <a:rPr lang="en-US" sz="1400" dirty="0">
+                <a:solidFill>
+                  <a:schemeClr val="bg1"/>
+                </a:solidFill>
+                <a:latin typeface="Helvetica Neue" charset="0"/>
+              </a:rPr>
+              <a:t>: Hardware packet filter supports 8 rules – comparison done in parallel. </a:t>
+            </a:r>
+          </a:p>
+        </p:txBody>
+      </p:sp>
+      <p:pic>
+        <p:nvPicPr>
+          <p:cNvPr id="11" name="Picture 10" descr="A screenshot of a computer&#10;&#10;Description automatically generated">
+            <a:extLst>
+              <a:ext uri="{FF2B5EF4-FFF2-40B4-BE49-F238E27FC236}">
+                <a16:creationId xmlns:a16="http://schemas.microsoft.com/office/drawing/2014/main" id="{AD421B88-58A7-B754-839B-8AA4BF6E8866}"/>
+              </a:ext>
+            </a:extLst>
+          </p:cNvPr>
+          <p:cNvPicPr>
+            <a:picLocks noChangeAspect="1"/>
+          </p:cNvPicPr>
+          <p:nvPr/>
+        </p:nvPicPr>
+        <p:blipFill>
           <a:blip r:embed="rId6"/>
           <a:stretch>
             <a:fillRect/>
@@ -3072,8 +3440,8 @@
         </p:blipFill>
         <p:spPr>
           <a:xfrm>
-            <a:off x="9128585" y="8794237"/>
-            <a:ext cx="2914650" cy="1571625"/>
+            <a:off x="3730797" y="4661415"/>
+            <a:ext cx="3662257" cy="4163260"/>
           </a:xfrm>
           <a:prstGeom prst="rect">
             <a:avLst/>

</xml_diff>

<commit_message>
Bit more stuff added to report and poster
</commit_message>
<xml_diff>
--- a/poster/poster_matthew_gilpin.pptx
+++ b/poster/poster_matthew_gilpin.pptx
@@ -3030,7 +3030,7 @@
                 <a:latin typeface="Helvetica Neue" charset="0"/>
                 <a:cs typeface="Helvetica Neue" charset="0"/>
               </a:rPr>
-              <a:t> – 100Mbit/s</a:t>
+              <a:t> firewall – 100Mbit/s</a:t>
             </a:r>
           </a:p>
           <a:p>
@@ -3039,7 +3039,7 @@
                 <a:latin typeface="Helvetica Neue" charset="0"/>
                 <a:cs typeface="Helvetica Neue" charset="0"/>
               </a:rPr>
-              <a:t>4uS of latency added</a:t>
+              <a:t>4us of latency added</a:t>
             </a:r>
           </a:p>
           <a:p>
@@ -3096,14 +3096,8 @@
                 <a:latin typeface="Helvetica Neue" charset="0"/>
                 <a:cs typeface="Helvetica Neue" charset="0"/>
               </a:rPr>
-              <a:t>Measured 0.51W power consumption</a:t>
-            </a:r>
-          </a:p>
-          <a:p>
-            <a:endParaRPr lang="en-US" dirty="0">
-              <a:latin typeface="Helvetica Neue" charset="0"/>
-              <a:cs typeface="Helvetica Neue" charset="0"/>
-            </a:endParaRPr>
+              <a:t>Total measured 0.51W power. Packet filter logic consumes ~2mW</a:t>
+            </a:r>
           </a:p>
           <a:p>
             <a:endParaRPr lang="en-US" dirty="0">
@@ -3221,7 +3215,7 @@
         </p:blipFill>
         <p:spPr>
           <a:xfrm>
-            <a:off x="12053110" y="5883669"/>
+            <a:off x="12053110" y="5910812"/>
             <a:ext cx="1481831" cy="799027"/>
           </a:xfrm>
           <a:prstGeom prst="rect">

</xml_diff>

<commit_message>
Updated powerpoint with bigger images
</commit_message>
<xml_diff>
--- a/poster/poster_matthew_gilpin.pptx
+++ b/poster/poster_matthew_gilpin.pptx
@@ -2316,36 +2316,329 @@
           <a:chExt cx="0" cy="0"/>
         </a:xfrm>
       </p:grpSpPr>
-      <p:pic>
-        <p:nvPicPr>
-          <p:cNvPr id="5" name="Picture 4" descr="A diagram of a computer&#10;&#10;Description automatically generated">
-            <a:extLst>
-              <a:ext uri="{FF2B5EF4-FFF2-40B4-BE49-F238E27FC236}">
-                <a16:creationId xmlns:a16="http://schemas.microsoft.com/office/drawing/2014/main" id="{8BD04A40-0D72-2EFB-9F45-BC807582B7B6}"/>
-              </a:ext>
-            </a:extLst>
-          </p:cNvPr>
-          <p:cNvPicPr>
-            <a:picLocks noChangeAspect="1"/>
-          </p:cNvPicPr>
-          <p:nvPr/>
-        </p:nvPicPr>
-        <p:blipFill>
-          <a:blip r:embed="rId2"/>
-          <a:stretch>
-            <a:fillRect/>
-          </a:stretch>
-        </p:blipFill>
+      <p:sp>
+        <p:nvSpPr>
+          <p:cNvPr id="3078" name="Content Placeholder 8"/>
+          <p:cNvSpPr>
+            <a:spLocks noGrp="1"/>
+          </p:cNvSpPr>
+          <p:nvPr>
+            <p:ph idx="12"/>
+          </p:nvPr>
+        </p:nvSpPr>
         <p:spPr>
           <a:xfrm>
-            <a:off x="7405437" y="3996256"/>
-            <a:ext cx="4167629" cy="3324106"/>
+            <a:off x="7449101" y="1270000"/>
+            <a:ext cx="3694267" cy="7656512"/>
           </a:xfrm>
-          <a:prstGeom prst="rect">
-            <a:avLst/>
-          </a:prstGeom>
+          <a:ln/>
         </p:spPr>
-      </p:pic>
+        <p:txBody>
+          <a:bodyPr/>
+          <a:lstStyle/>
+          <a:p>
+            <a:pPr>
+              <a:spcBef>
+                <a:spcPts val="300"/>
+              </a:spcBef>
+            </a:pPr>
+            <a:r>
+              <a:rPr lang="en-US" sz="1800" dirty="0">
+                <a:latin typeface="Bodoni MT" charset="0"/>
+              </a:rPr>
+              <a:t>DESIGN</a:t>
+            </a:r>
+          </a:p>
+          <a:p>
+            <a:pPr algn="just">
+              <a:spcBef>
+                <a:spcPts val="300"/>
+              </a:spcBef>
+            </a:pPr>
+            <a:r>
+              <a:rPr lang="en-AU" dirty="0" err="1">
+                <a:latin typeface="Helvetica Neue" charset="0"/>
+              </a:rPr>
+              <a:t>Digilent</a:t>
+            </a:r>
+            <a:r>
+              <a:rPr lang="en-AU" dirty="0">
+                <a:latin typeface="Helvetica Neue" charset="0"/>
+              </a:rPr>
+              <a:t> </a:t>
+            </a:r>
+            <a:r>
+              <a:rPr lang="en-AU" dirty="0" err="1">
+                <a:latin typeface="Helvetica Neue" charset="0"/>
+              </a:rPr>
+              <a:t>Nexys</a:t>
+            </a:r>
+            <a:r>
+              <a:rPr lang="en-AU" dirty="0">
+                <a:latin typeface="Helvetica Neue" charset="0"/>
+              </a:rPr>
+              <a:t> A7 Development Board</a:t>
+            </a:r>
+          </a:p>
+          <a:p>
+            <a:pPr algn="just">
+              <a:spcBef>
+                <a:spcPts val="0"/>
+              </a:spcBef>
+            </a:pPr>
+            <a:r>
+              <a:rPr lang="en-AU" dirty="0">
+                <a:latin typeface="Helvetica Neue" charset="0"/>
+              </a:rPr>
+              <a:t>  - Xilinx </a:t>
+            </a:r>
+            <a:r>
+              <a:rPr lang="en-AU" b="1" dirty="0" err="1">
+                <a:latin typeface="Helvetica Neue" charset="0"/>
+              </a:rPr>
+              <a:t>Artix</a:t>
+            </a:r>
+            <a:r>
+              <a:rPr lang="en-AU" b="1" dirty="0">
+                <a:latin typeface="Helvetica Neue" charset="0"/>
+              </a:rPr>
+              <a:t> 7 100T </a:t>
+            </a:r>
+            <a:r>
+              <a:rPr lang="en-AU" dirty="0">
+                <a:latin typeface="Helvetica Neue" charset="0"/>
+              </a:rPr>
+              <a:t>FPGA.</a:t>
+            </a:r>
+          </a:p>
+          <a:p>
+            <a:pPr>
+              <a:spcBef>
+                <a:spcPts val="0"/>
+              </a:spcBef>
+            </a:pPr>
+            <a:r>
+              <a:rPr lang="en-AU" dirty="0">
+                <a:latin typeface="Helvetica Neue" charset="0"/>
+              </a:rPr>
+              <a:t>  - </a:t>
+            </a:r>
+            <a:r>
+              <a:rPr lang="en-AU" b="1" dirty="0">
+                <a:latin typeface="Helvetica Neue" charset="0"/>
+              </a:rPr>
+              <a:t>LAN8720A</a:t>
+            </a:r>
+            <a:r>
+              <a:rPr lang="en-AU" dirty="0">
+                <a:latin typeface="Helvetica Neue" charset="0"/>
+              </a:rPr>
+              <a:t> RMII PHY</a:t>
+            </a:r>
+          </a:p>
+          <a:p>
+            <a:pPr>
+              <a:spcBef>
+                <a:spcPts val="0"/>
+              </a:spcBef>
+            </a:pPr>
+            <a:br>
+              <a:rPr lang="en-AU" dirty="0">
+                <a:latin typeface="Helvetica Neue" charset="0"/>
+              </a:rPr>
+            </a:br>
+            <a:r>
+              <a:rPr lang="en-AU" b="1" dirty="0">
+                <a:latin typeface="Helvetica Neue" charset="0"/>
+              </a:rPr>
+              <a:t>NEORV32</a:t>
+            </a:r>
+            <a:r>
+              <a:rPr lang="en-AU" dirty="0">
+                <a:latin typeface="Helvetica Neue" charset="0"/>
+              </a:rPr>
+              <a:t> RISC-V softcore at 80Mhz</a:t>
+            </a:r>
+          </a:p>
+          <a:p>
+            <a:pPr algn="just">
+              <a:spcBef>
+                <a:spcPts val="1200"/>
+              </a:spcBef>
+            </a:pPr>
+            <a:r>
+              <a:rPr lang="en-AU" dirty="0">
+                <a:latin typeface="Helvetica Neue" charset="0"/>
+              </a:rPr>
+              <a:t>Ethernet Controller over Wishbone Classic</a:t>
+            </a:r>
+          </a:p>
+          <a:p>
+            <a:pPr algn="just">
+              <a:spcBef>
+                <a:spcPts val="300"/>
+              </a:spcBef>
+            </a:pPr>
+            <a:r>
+              <a:rPr lang="en-AU" dirty="0">
+                <a:latin typeface="Helvetica Neue" charset="0"/>
+              </a:rPr>
+              <a:t>    - 32-bit wide memory mapped peripheral</a:t>
+            </a:r>
+          </a:p>
+          <a:p>
+            <a:pPr algn="just"/>
+            <a:r>
+              <a:rPr lang="en-AU" dirty="0">
+                <a:latin typeface="Helvetica Neue" charset="0"/>
+              </a:rPr>
+              <a:t>    - computes CRC32 on the fly</a:t>
+            </a:r>
+          </a:p>
+          <a:p>
+            <a:pPr algn="just"/>
+            <a:r>
+              <a:rPr lang="en-AU" dirty="0">
+                <a:latin typeface="Helvetica Neue" charset="0"/>
+              </a:rPr>
+              <a:t>    - designed from scratch</a:t>
+            </a:r>
+          </a:p>
+          <a:p>
+            <a:pPr algn="just"/>
+            <a:endParaRPr lang="en-AU" dirty="0">
+              <a:latin typeface="Helvetica Neue" charset="0"/>
+            </a:endParaRPr>
+          </a:p>
+          <a:p>
+            <a:pPr algn="just"/>
+            <a:endParaRPr lang="en-AU" dirty="0">
+              <a:latin typeface="Helvetica Neue" charset="0"/>
+            </a:endParaRPr>
+          </a:p>
+          <a:p>
+            <a:pPr algn="just"/>
+            <a:endParaRPr lang="en-AU" dirty="0">
+              <a:latin typeface="Helvetica Neue" charset="0"/>
+            </a:endParaRPr>
+          </a:p>
+          <a:p>
+            <a:pPr algn="just"/>
+            <a:endParaRPr lang="en-AU" dirty="0">
+              <a:latin typeface="Helvetica Neue" charset="0"/>
+            </a:endParaRPr>
+          </a:p>
+          <a:p>
+            <a:pPr algn="just"/>
+            <a:endParaRPr lang="en-AU" dirty="0">
+              <a:latin typeface="Helvetica Neue" charset="0"/>
+            </a:endParaRPr>
+          </a:p>
+          <a:p>
+            <a:pPr algn="just"/>
+            <a:endParaRPr lang="en-AU" dirty="0">
+              <a:latin typeface="Helvetica Neue" charset="0"/>
+            </a:endParaRPr>
+          </a:p>
+          <a:p>
+            <a:pPr algn="just"/>
+            <a:endParaRPr lang="en-AU" dirty="0">
+              <a:latin typeface="Helvetica Neue" charset="0"/>
+            </a:endParaRPr>
+          </a:p>
+          <a:p>
+            <a:pPr algn="just"/>
+            <a:endParaRPr lang="en-AU" dirty="0">
+              <a:latin typeface="Helvetica Neue" charset="0"/>
+            </a:endParaRPr>
+          </a:p>
+          <a:p>
+            <a:pPr algn="just"/>
+            <a:endParaRPr lang="en-AU" dirty="0">
+              <a:latin typeface="Helvetica Neue" charset="0"/>
+            </a:endParaRPr>
+          </a:p>
+          <a:p>
+            <a:pPr algn="just"/>
+            <a:endParaRPr lang="en-AU" dirty="0">
+              <a:latin typeface="Helvetica Neue" charset="0"/>
+            </a:endParaRPr>
+          </a:p>
+          <a:p>
+            <a:pPr algn="just"/>
+            <a:endParaRPr lang="en-AU" dirty="0">
+              <a:latin typeface="Helvetica Neue" charset="0"/>
+            </a:endParaRPr>
+          </a:p>
+          <a:p>
+            <a:pPr algn="just"/>
+            <a:endParaRPr lang="en-AU" dirty="0">
+              <a:latin typeface="Helvetica Neue" charset="0"/>
+            </a:endParaRPr>
+          </a:p>
+          <a:p>
+            <a:pPr algn="just"/>
+            <a:endParaRPr lang="en-AU" dirty="0">
+              <a:latin typeface="Helvetica Neue" charset="0"/>
+            </a:endParaRPr>
+          </a:p>
+          <a:p>
+            <a:pPr algn="just"/>
+            <a:endParaRPr lang="en-AU" dirty="0">
+              <a:latin typeface="Helvetica Neue" charset="0"/>
+            </a:endParaRPr>
+          </a:p>
+          <a:p>
+            <a:pPr algn="just"/>
+            <a:endParaRPr lang="en-AU" dirty="0">
+              <a:latin typeface="Helvetica Neue" charset="0"/>
+            </a:endParaRPr>
+          </a:p>
+          <a:p>
+            <a:pPr algn="just"/>
+            <a:endParaRPr lang="en-AU" dirty="0">
+              <a:latin typeface="Helvetica Neue" charset="0"/>
+            </a:endParaRPr>
+          </a:p>
+          <a:p>
+            <a:pPr algn="just"/>
+            <a:endParaRPr lang="en-AU" dirty="0">
+              <a:latin typeface="Helvetica Neue" charset="0"/>
+            </a:endParaRPr>
+          </a:p>
+          <a:p>
+            <a:pPr algn="just"/>
+            <a:endParaRPr lang="en-AU" dirty="0">
+              <a:latin typeface="Helvetica Neue" charset="0"/>
+            </a:endParaRPr>
+          </a:p>
+          <a:p>
+            <a:pPr algn="just"/>
+            <a:r>
+              <a:rPr lang="en-AU" dirty="0" err="1">
+                <a:latin typeface="Helvetica Neue" charset="0"/>
+              </a:rPr>
+              <a:t>FreeRTOS</a:t>
+            </a:r>
+            <a:r>
+              <a:rPr lang="en-AU" dirty="0">
+                <a:latin typeface="Helvetica Neue" charset="0"/>
+              </a:rPr>
+              <a:t>-Plus-TCP handles layer 3 and up including webserver.</a:t>
+            </a:r>
+          </a:p>
+          <a:p>
+            <a:endParaRPr lang="en-US" dirty="0">
+              <a:latin typeface="Helvetica Neue" charset="0"/>
+            </a:endParaRPr>
+          </a:p>
+          <a:p>
+            <a:endParaRPr lang="en-US" sz="1600" dirty="0">
+              <a:latin typeface="Helvetica Neue" charset="0"/>
+            </a:endParaRPr>
+          </a:p>
+        </p:txBody>
+      </p:sp>
       <p:sp>
         <p:nvSpPr>
           <p:cNvPr id="3074" name="Content Placeholder 1"/>
@@ -2814,329 +3107,6 @@
       </p:sp>
       <p:sp>
         <p:nvSpPr>
-          <p:cNvPr id="3078" name="Content Placeholder 8"/>
-          <p:cNvSpPr>
-            <a:spLocks noGrp="1"/>
-          </p:cNvSpPr>
-          <p:nvPr>
-            <p:ph idx="12"/>
-          </p:nvPr>
-        </p:nvSpPr>
-        <p:spPr>
-          <a:xfrm>
-            <a:off x="7449101" y="1270000"/>
-            <a:ext cx="3694267" cy="7656512"/>
-          </a:xfrm>
-          <a:ln/>
-        </p:spPr>
-        <p:txBody>
-          <a:bodyPr/>
-          <a:lstStyle/>
-          <a:p>
-            <a:pPr>
-              <a:spcBef>
-                <a:spcPts val="300"/>
-              </a:spcBef>
-            </a:pPr>
-            <a:r>
-              <a:rPr lang="en-US" sz="1800" dirty="0">
-                <a:latin typeface="Bodoni MT" charset="0"/>
-              </a:rPr>
-              <a:t>DESIGN</a:t>
-            </a:r>
-          </a:p>
-          <a:p>
-            <a:pPr algn="just">
-              <a:spcBef>
-                <a:spcPts val="300"/>
-              </a:spcBef>
-            </a:pPr>
-            <a:r>
-              <a:rPr lang="en-AU" dirty="0" err="1">
-                <a:latin typeface="Helvetica Neue" charset="0"/>
-              </a:rPr>
-              <a:t>Digilent</a:t>
-            </a:r>
-            <a:r>
-              <a:rPr lang="en-AU" dirty="0">
-                <a:latin typeface="Helvetica Neue" charset="0"/>
-              </a:rPr>
-              <a:t> </a:t>
-            </a:r>
-            <a:r>
-              <a:rPr lang="en-AU" dirty="0" err="1">
-                <a:latin typeface="Helvetica Neue" charset="0"/>
-              </a:rPr>
-              <a:t>Nexys</a:t>
-            </a:r>
-            <a:r>
-              <a:rPr lang="en-AU" dirty="0">
-                <a:latin typeface="Helvetica Neue" charset="0"/>
-              </a:rPr>
-              <a:t> A7 Development Board</a:t>
-            </a:r>
-          </a:p>
-          <a:p>
-            <a:pPr algn="just">
-              <a:spcBef>
-                <a:spcPts val="0"/>
-              </a:spcBef>
-            </a:pPr>
-            <a:r>
-              <a:rPr lang="en-AU" dirty="0">
-                <a:latin typeface="Helvetica Neue" charset="0"/>
-              </a:rPr>
-              <a:t>  - Xilinx </a:t>
-            </a:r>
-            <a:r>
-              <a:rPr lang="en-AU" b="1" dirty="0" err="1">
-                <a:latin typeface="Helvetica Neue" charset="0"/>
-              </a:rPr>
-              <a:t>Artix</a:t>
-            </a:r>
-            <a:r>
-              <a:rPr lang="en-AU" b="1" dirty="0">
-                <a:latin typeface="Helvetica Neue" charset="0"/>
-              </a:rPr>
-              <a:t> 7 100T </a:t>
-            </a:r>
-            <a:r>
-              <a:rPr lang="en-AU" dirty="0">
-                <a:latin typeface="Helvetica Neue" charset="0"/>
-              </a:rPr>
-              <a:t>FPGA.</a:t>
-            </a:r>
-          </a:p>
-          <a:p>
-            <a:pPr>
-              <a:spcBef>
-                <a:spcPts val="0"/>
-              </a:spcBef>
-            </a:pPr>
-            <a:r>
-              <a:rPr lang="en-AU" dirty="0">
-                <a:latin typeface="Helvetica Neue" charset="0"/>
-              </a:rPr>
-              <a:t>  - </a:t>
-            </a:r>
-            <a:r>
-              <a:rPr lang="en-AU" b="1" dirty="0">
-                <a:latin typeface="Helvetica Neue" charset="0"/>
-              </a:rPr>
-              <a:t>LAN8720A</a:t>
-            </a:r>
-            <a:r>
-              <a:rPr lang="en-AU" dirty="0">
-                <a:latin typeface="Helvetica Neue" charset="0"/>
-              </a:rPr>
-              <a:t> RMII PHY</a:t>
-            </a:r>
-          </a:p>
-          <a:p>
-            <a:pPr>
-              <a:spcBef>
-                <a:spcPts val="0"/>
-              </a:spcBef>
-            </a:pPr>
-            <a:br>
-              <a:rPr lang="en-AU" dirty="0">
-                <a:latin typeface="Helvetica Neue" charset="0"/>
-              </a:rPr>
-            </a:br>
-            <a:r>
-              <a:rPr lang="en-AU" b="1" dirty="0">
-                <a:latin typeface="Helvetica Neue" charset="0"/>
-              </a:rPr>
-              <a:t>NEORV32</a:t>
-            </a:r>
-            <a:r>
-              <a:rPr lang="en-AU" dirty="0">
-                <a:latin typeface="Helvetica Neue" charset="0"/>
-              </a:rPr>
-              <a:t> RISC-V softcore at 80Mhz</a:t>
-            </a:r>
-          </a:p>
-          <a:p>
-            <a:pPr algn="just">
-              <a:spcBef>
-                <a:spcPts val="1200"/>
-              </a:spcBef>
-            </a:pPr>
-            <a:r>
-              <a:rPr lang="en-AU" dirty="0">
-                <a:latin typeface="Helvetica Neue" charset="0"/>
-              </a:rPr>
-              <a:t>Ethernet Controller over Wishbone Classic</a:t>
-            </a:r>
-          </a:p>
-          <a:p>
-            <a:pPr algn="just">
-              <a:spcBef>
-                <a:spcPts val="300"/>
-              </a:spcBef>
-            </a:pPr>
-            <a:r>
-              <a:rPr lang="en-AU" dirty="0">
-                <a:latin typeface="Helvetica Neue" charset="0"/>
-              </a:rPr>
-              <a:t>    - 32-bit wide memory mapped peripheral</a:t>
-            </a:r>
-          </a:p>
-          <a:p>
-            <a:pPr algn="just"/>
-            <a:r>
-              <a:rPr lang="en-AU" dirty="0">
-                <a:latin typeface="Helvetica Neue" charset="0"/>
-              </a:rPr>
-              <a:t>    - computes CRC32 on the fly</a:t>
-            </a:r>
-          </a:p>
-          <a:p>
-            <a:pPr algn="just"/>
-            <a:r>
-              <a:rPr lang="en-AU" dirty="0">
-                <a:latin typeface="Helvetica Neue" charset="0"/>
-              </a:rPr>
-              <a:t>    - designed from scratch</a:t>
-            </a:r>
-          </a:p>
-          <a:p>
-            <a:pPr algn="just"/>
-            <a:endParaRPr lang="en-AU" dirty="0">
-              <a:latin typeface="Helvetica Neue" charset="0"/>
-            </a:endParaRPr>
-          </a:p>
-          <a:p>
-            <a:pPr algn="just"/>
-            <a:endParaRPr lang="en-AU" dirty="0">
-              <a:latin typeface="Helvetica Neue" charset="0"/>
-            </a:endParaRPr>
-          </a:p>
-          <a:p>
-            <a:pPr algn="just"/>
-            <a:endParaRPr lang="en-AU" dirty="0">
-              <a:latin typeface="Helvetica Neue" charset="0"/>
-            </a:endParaRPr>
-          </a:p>
-          <a:p>
-            <a:pPr algn="just"/>
-            <a:endParaRPr lang="en-AU" dirty="0">
-              <a:latin typeface="Helvetica Neue" charset="0"/>
-            </a:endParaRPr>
-          </a:p>
-          <a:p>
-            <a:pPr algn="just"/>
-            <a:endParaRPr lang="en-AU" dirty="0">
-              <a:latin typeface="Helvetica Neue" charset="0"/>
-            </a:endParaRPr>
-          </a:p>
-          <a:p>
-            <a:pPr algn="just"/>
-            <a:endParaRPr lang="en-AU" dirty="0">
-              <a:latin typeface="Helvetica Neue" charset="0"/>
-            </a:endParaRPr>
-          </a:p>
-          <a:p>
-            <a:pPr algn="just"/>
-            <a:endParaRPr lang="en-AU" dirty="0">
-              <a:latin typeface="Helvetica Neue" charset="0"/>
-            </a:endParaRPr>
-          </a:p>
-          <a:p>
-            <a:pPr algn="just"/>
-            <a:endParaRPr lang="en-AU" dirty="0">
-              <a:latin typeface="Helvetica Neue" charset="0"/>
-            </a:endParaRPr>
-          </a:p>
-          <a:p>
-            <a:pPr algn="just"/>
-            <a:endParaRPr lang="en-AU" dirty="0">
-              <a:latin typeface="Helvetica Neue" charset="0"/>
-            </a:endParaRPr>
-          </a:p>
-          <a:p>
-            <a:pPr algn="just"/>
-            <a:endParaRPr lang="en-AU" dirty="0">
-              <a:latin typeface="Helvetica Neue" charset="0"/>
-            </a:endParaRPr>
-          </a:p>
-          <a:p>
-            <a:pPr algn="just"/>
-            <a:endParaRPr lang="en-AU" dirty="0">
-              <a:latin typeface="Helvetica Neue" charset="0"/>
-            </a:endParaRPr>
-          </a:p>
-          <a:p>
-            <a:pPr algn="just"/>
-            <a:endParaRPr lang="en-AU" dirty="0">
-              <a:latin typeface="Helvetica Neue" charset="0"/>
-            </a:endParaRPr>
-          </a:p>
-          <a:p>
-            <a:pPr algn="just"/>
-            <a:endParaRPr lang="en-AU" dirty="0">
-              <a:latin typeface="Helvetica Neue" charset="0"/>
-            </a:endParaRPr>
-          </a:p>
-          <a:p>
-            <a:pPr algn="just"/>
-            <a:endParaRPr lang="en-AU" dirty="0">
-              <a:latin typeface="Helvetica Neue" charset="0"/>
-            </a:endParaRPr>
-          </a:p>
-          <a:p>
-            <a:pPr algn="just"/>
-            <a:endParaRPr lang="en-AU" dirty="0">
-              <a:latin typeface="Helvetica Neue" charset="0"/>
-            </a:endParaRPr>
-          </a:p>
-          <a:p>
-            <a:pPr algn="just"/>
-            <a:endParaRPr lang="en-AU" dirty="0">
-              <a:latin typeface="Helvetica Neue" charset="0"/>
-            </a:endParaRPr>
-          </a:p>
-          <a:p>
-            <a:pPr algn="just"/>
-            <a:endParaRPr lang="en-AU" dirty="0">
-              <a:latin typeface="Helvetica Neue" charset="0"/>
-            </a:endParaRPr>
-          </a:p>
-          <a:p>
-            <a:pPr algn="just"/>
-            <a:endParaRPr lang="en-AU" dirty="0">
-              <a:latin typeface="Helvetica Neue" charset="0"/>
-            </a:endParaRPr>
-          </a:p>
-          <a:p>
-            <a:pPr algn="just"/>
-            <a:r>
-              <a:rPr lang="en-AU" dirty="0" err="1">
-                <a:latin typeface="Helvetica Neue" charset="0"/>
-              </a:rPr>
-              <a:t>FreeRTOS</a:t>
-            </a:r>
-            <a:r>
-              <a:rPr lang="en-AU" dirty="0">
-                <a:latin typeface="Helvetica Neue" charset="0"/>
-              </a:rPr>
-              <a:t>-Plus-TCP handles layer 3 and up including webserver.</a:t>
-            </a:r>
-          </a:p>
-          <a:p>
-            <a:endParaRPr lang="en-US" dirty="0">
-              <a:latin typeface="Helvetica Neue" charset="0"/>
-            </a:endParaRPr>
-          </a:p>
-          <a:p>
-            <a:endParaRPr lang="en-US" sz="1600" dirty="0">
-              <a:latin typeface="Helvetica Neue" charset="0"/>
-            </a:endParaRPr>
-          </a:p>
-        </p:txBody>
-      </p:sp>
-      <p:sp>
-        <p:nvSpPr>
           <p:cNvPr id="3079" name="Content Placeholder 9"/>
           <p:cNvSpPr>
             <a:spLocks noGrp="1"/>
@@ -3391,7 +3361,7 @@
           <p:nvPr/>
         </p:nvPicPr>
         <p:blipFill rotWithShape="1">
-          <a:blip r:embed="rId3"/>
+          <a:blip r:embed="rId2"/>
           <a:srcRect t="7375" b="7192"/>
           <a:stretch/>
         </p:blipFill>
@@ -3420,7 +3390,7 @@
           <p:nvPr/>
         </p:nvPicPr>
         <p:blipFill>
-          <a:blip r:embed="rId4"/>
+          <a:blip r:embed="rId3"/>
           <a:stretch>
             <a:fillRect/>
           </a:stretch>
@@ -3450,7 +3420,7 @@
           <p:nvPr/>
         </p:nvPicPr>
         <p:blipFill>
-          <a:blip r:embed="rId5"/>
+          <a:blip r:embed="rId4"/>
           <a:stretch>
             <a:fillRect/>
           </a:stretch>
@@ -3618,36 +3588,6 @@
           </a:p>
         </p:txBody>
       </p:sp>
-      <p:pic>
-        <p:nvPicPr>
-          <p:cNvPr id="11" name="Picture 10" descr="A screenshot of a computer&#10;&#10;Description automatically generated">
-            <a:extLst>
-              <a:ext uri="{FF2B5EF4-FFF2-40B4-BE49-F238E27FC236}">
-                <a16:creationId xmlns:a16="http://schemas.microsoft.com/office/drawing/2014/main" id="{AD421B88-58A7-B754-839B-8AA4BF6E8866}"/>
-              </a:ext>
-            </a:extLst>
-          </p:cNvPr>
-          <p:cNvPicPr>
-            <a:picLocks noChangeAspect="1"/>
-          </p:cNvPicPr>
-          <p:nvPr/>
-        </p:nvPicPr>
-        <p:blipFill>
-          <a:blip r:embed="rId6"/>
-          <a:stretch>
-            <a:fillRect/>
-          </a:stretch>
-        </p:blipFill>
-        <p:spPr>
-          <a:xfrm>
-            <a:off x="3830123" y="4703899"/>
-            <a:ext cx="3662257" cy="4163260"/>
-          </a:xfrm>
-          <a:prstGeom prst="rect">
-            <a:avLst/>
-          </a:prstGeom>
-        </p:spPr>
-      </p:pic>
       <p:sp>
         <p:nvSpPr>
           <p:cNvPr id="2" name="TextBox 1">
@@ -3709,6 +3649,66 @@
           </a:p>
         </p:txBody>
       </p:sp>
+      <p:pic>
+        <p:nvPicPr>
+          <p:cNvPr id="10" name="Picture 9" descr="A computer screen shot of a computer&#10;&#10;Description automatically generated">
+            <a:extLst>
+              <a:ext uri="{FF2B5EF4-FFF2-40B4-BE49-F238E27FC236}">
+                <a16:creationId xmlns:a16="http://schemas.microsoft.com/office/drawing/2014/main" id="{2FDE18D6-B05D-C416-1E84-6F3722093014}"/>
+              </a:ext>
+            </a:extLst>
+          </p:cNvPr>
+          <p:cNvPicPr>
+            <a:picLocks noChangeAspect="1"/>
+          </p:cNvPicPr>
+          <p:nvPr/>
+        </p:nvPicPr>
+        <p:blipFill>
+          <a:blip r:embed="rId5"/>
+          <a:stretch>
+            <a:fillRect/>
+          </a:stretch>
+        </p:blipFill>
+        <p:spPr>
+          <a:xfrm>
+            <a:off x="7215610" y="4170241"/>
+            <a:ext cx="4391386" cy="3192877"/>
+          </a:xfrm>
+          <a:prstGeom prst="rect">
+            <a:avLst/>
+          </a:prstGeom>
+        </p:spPr>
+      </p:pic>
+      <p:pic>
+        <p:nvPicPr>
+          <p:cNvPr id="14" name="Picture 13" descr="A screenshot of a computer&#10;&#10;Description automatically generated">
+            <a:extLst>
+              <a:ext uri="{FF2B5EF4-FFF2-40B4-BE49-F238E27FC236}">
+                <a16:creationId xmlns:a16="http://schemas.microsoft.com/office/drawing/2014/main" id="{39820393-3D4F-2131-B83A-B9DDD5D69EA6}"/>
+              </a:ext>
+            </a:extLst>
+          </p:cNvPr>
+          <p:cNvPicPr>
+            <a:picLocks noChangeAspect="1"/>
+          </p:cNvPicPr>
+          <p:nvPr/>
+        </p:nvPicPr>
+        <p:blipFill>
+          <a:blip r:embed="rId6"/>
+          <a:stretch>
+            <a:fillRect/>
+          </a:stretch>
+        </p:blipFill>
+        <p:spPr>
+          <a:xfrm>
+            <a:off x="3763950" y="4603954"/>
+            <a:ext cx="3755181" cy="4263320"/>
+          </a:xfrm>
+          <a:prstGeom prst="rect">
+            <a:avLst/>
+          </a:prstGeom>
+        </p:spPr>
+      </p:pic>
     </p:spTree>
   </p:cSld>
   <p:clrMapOvr>

</xml_diff>

<commit_message>
Updated poster to use bullet points
</commit_message>
<xml_diff>
--- a/poster/poster_matthew_gilpin.pptx
+++ b/poster/poster_matthew_gilpin.pptx
@@ -253,7 +253,7 @@
               <a:pPr>
                 <a:defRPr/>
               </a:pPr>
-              <a:t>10/8/2023</a:t>
+              <a:t>10/9/2023</a:t>
             </a:fld>
             <a:endParaRPr lang="en-US"/>
           </a:p>
@@ -763,7 +763,7 @@
               <a:pPr>
                 <a:defRPr/>
               </a:pPr>
-              <a:t>10/8/2023</a:t>
+              <a:t>10/9/2023</a:t>
             </a:fld>
             <a:endParaRPr lang="en-US"/>
           </a:p>
@@ -1789,7 +1789,7 @@
               <a:pPr>
                 <a:defRPr/>
               </a:pPr>
-              <a:t>10/8/2023</a:t>
+              <a:t>10/9/2023</a:t>
             </a:fld>
             <a:endParaRPr lang="en-US"/>
           </a:p>
@@ -2328,8 +2328,8 @@
         </p:nvSpPr>
         <p:spPr>
           <a:xfrm>
-            <a:off x="7449101" y="1270000"/>
-            <a:ext cx="3694267" cy="7656512"/>
+            <a:off x="7409295" y="1270000"/>
+            <a:ext cx="3862790" cy="7656512"/>
           </a:xfrm>
           <a:ln/>
         </p:spPr>
@@ -2350,158 +2350,169 @@
             </a:r>
           </a:p>
           <a:p>
+            <a:pPr marL="180000" indent="-180000" algn="just">
+              <a:spcBef>
+                <a:spcPts val="300"/>
+              </a:spcBef>
+              <a:buFont typeface="Arial" panose="020B0604020202020204" pitchFamily="34" charset="0"/>
+              <a:buChar char="•"/>
+            </a:pPr>
+            <a:r>
+              <a:rPr lang="en-AU" dirty="0" err="1">
+                <a:latin typeface="Helvetica Neue" charset="0"/>
+              </a:rPr>
+              <a:t>Digilent</a:t>
+            </a:r>
+            <a:r>
+              <a:rPr lang="en-AU" dirty="0">
+                <a:latin typeface="Helvetica Neue" charset="0"/>
+              </a:rPr>
+              <a:t> </a:t>
+            </a:r>
+            <a:r>
+              <a:rPr lang="en-AU" dirty="0" err="1">
+                <a:latin typeface="Helvetica Neue" charset="0"/>
+              </a:rPr>
+              <a:t>Nexys</a:t>
+            </a:r>
+            <a:r>
+              <a:rPr lang="en-AU" dirty="0">
+                <a:latin typeface="Helvetica Neue" charset="0"/>
+              </a:rPr>
+              <a:t> A7 Development Board</a:t>
+            </a:r>
+          </a:p>
+          <a:p>
+            <a:pPr algn="just">
+              <a:spcBef>
+                <a:spcPts val="0"/>
+              </a:spcBef>
+            </a:pPr>
+            <a:r>
+              <a:rPr lang="en-AU" dirty="0">
+                <a:latin typeface="Helvetica Neue" charset="0"/>
+              </a:rPr>
+              <a:t>      - Xilinx </a:t>
+            </a:r>
+            <a:r>
+              <a:rPr lang="en-AU" b="1" dirty="0" err="1">
+                <a:latin typeface="Helvetica Neue" charset="0"/>
+              </a:rPr>
+              <a:t>Artix</a:t>
+            </a:r>
+            <a:r>
+              <a:rPr lang="en-AU" b="1" dirty="0">
+                <a:latin typeface="Helvetica Neue" charset="0"/>
+              </a:rPr>
+              <a:t> 7 100T </a:t>
+            </a:r>
+            <a:r>
+              <a:rPr lang="en-AU" dirty="0">
+                <a:latin typeface="Helvetica Neue" charset="0"/>
+              </a:rPr>
+              <a:t>FPGA.</a:t>
+            </a:r>
+          </a:p>
+          <a:p>
+            <a:pPr>
+              <a:spcBef>
+                <a:spcPts val="0"/>
+              </a:spcBef>
+            </a:pPr>
+            <a:r>
+              <a:rPr lang="en-AU" dirty="0">
+                <a:latin typeface="Helvetica Neue" charset="0"/>
+              </a:rPr>
+              <a:t>      - </a:t>
+            </a:r>
+            <a:r>
+              <a:rPr lang="en-AU" b="1" dirty="0">
+                <a:latin typeface="Helvetica Neue" charset="0"/>
+              </a:rPr>
+              <a:t>LAN8720A</a:t>
+            </a:r>
+            <a:r>
+              <a:rPr lang="en-AU" dirty="0">
+                <a:latin typeface="Helvetica Neue" charset="0"/>
+              </a:rPr>
+              <a:t> RMII PHY</a:t>
+            </a:r>
+          </a:p>
+          <a:p>
+            <a:pPr>
+              <a:spcBef>
+                <a:spcPts val="0"/>
+              </a:spcBef>
+            </a:pPr>
+            <a:endParaRPr lang="en-AU" dirty="0">
+              <a:latin typeface="Helvetica Neue" charset="0"/>
+            </a:endParaRPr>
+          </a:p>
+          <a:p>
+            <a:pPr marL="180000" indent="-180000">
+              <a:spcBef>
+                <a:spcPts val="0"/>
+              </a:spcBef>
+              <a:buFont typeface="Arial" panose="020B0604020202020204" pitchFamily="34" charset="0"/>
+              <a:buChar char="•"/>
+            </a:pPr>
+            <a:r>
+              <a:rPr lang="en-AU" b="1" dirty="0">
+                <a:latin typeface="Helvetica Neue" charset="0"/>
+              </a:rPr>
+              <a:t>NEORV32</a:t>
+            </a:r>
+            <a:r>
+              <a:rPr lang="en-AU" dirty="0">
+                <a:latin typeface="Helvetica Neue" charset="0"/>
+              </a:rPr>
+              <a:t> RISC-V softcore at 80Mhz</a:t>
+            </a:r>
+          </a:p>
+          <a:p>
+            <a:pPr marL="180000" indent="-180000" algn="just">
+              <a:spcBef>
+                <a:spcPts val="1200"/>
+              </a:spcBef>
+              <a:buFont typeface="Arial" panose="020B0604020202020204" pitchFamily="34" charset="0"/>
+              <a:buChar char="•"/>
+            </a:pPr>
+            <a:r>
+              <a:rPr lang="en-AU" dirty="0">
+                <a:latin typeface="Helvetica Neue" charset="0"/>
+              </a:rPr>
+              <a:t>Ethernet Controller over Wishbone Classic</a:t>
+            </a:r>
+          </a:p>
+          <a:p>
             <a:pPr algn="just">
               <a:spcBef>
                 <a:spcPts val="300"/>
               </a:spcBef>
             </a:pPr>
             <a:r>
-              <a:rPr lang="en-AU" dirty="0" err="1">
-                <a:latin typeface="Helvetica Neue" charset="0"/>
-              </a:rPr>
-              <a:t>Digilent</a:t>
-            </a:r>
-            <a:r>
               <a:rPr lang="en-AU" dirty="0">
                 <a:latin typeface="Helvetica Neue" charset="0"/>
               </a:rPr>
-              <a:t> </a:t>
-            </a:r>
-            <a:r>
-              <a:rPr lang="en-AU" dirty="0" err="1">
-                <a:latin typeface="Helvetica Neue" charset="0"/>
-              </a:rPr>
-              <a:t>Nexys</a:t>
-            </a:r>
+              <a:t>      - 32-bit wide memory mapped peripheral</a:t>
+            </a:r>
+          </a:p>
+          <a:p>
+            <a:pPr algn="just"/>
             <a:r>
               <a:rPr lang="en-AU" dirty="0">
                 <a:latin typeface="Helvetica Neue" charset="0"/>
               </a:rPr>
-              <a:t> A7 Development Board</a:t>
-            </a:r>
-          </a:p>
-          <a:p>
-            <a:pPr algn="just">
-              <a:spcBef>
-                <a:spcPts val="0"/>
-              </a:spcBef>
-            </a:pPr>
+              <a:t>      - computes CRC32 on the fly</a:t>
+            </a:r>
+          </a:p>
+          <a:p>
+            <a:pPr algn="just"/>
             <a:r>
               <a:rPr lang="en-AU" dirty="0">
                 <a:latin typeface="Helvetica Neue" charset="0"/>
               </a:rPr>
-              <a:t>  - Xilinx </a:t>
-            </a:r>
-            <a:r>
-              <a:rPr lang="en-AU" b="1" dirty="0" err="1">
-                <a:latin typeface="Helvetica Neue" charset="0"/>
-              </a:rPr>
-              <a:t>Artix</a:t>
-            </a:r>
-            <a:r>
-              <a:rPr lang="en-AU" b="1" dirty="0">
-                <a:latin typeface="Helvetica Neue" charset="0"/>
-              </a:rPr>
-              <a:t> 7 100T </a:t>
-            </a:r>
-            <a:r>
-              <a:rPr lang="en-AU" dirty="0">
-                <a:latin typeface="Helvetica Neue" charset="0"/>
-              </a:rPr>
-              <a:t>FPGA.</a:t>
-            </a:r>
-          </a:p>
-          <a:p>
-            <a:pPr>
-              <a:spcBef>
-                <a:spcPts val="0"/>
-              </a:spcBef>
-            </a:pPr>
-            <a:r>
-              <a:rPr lang="en-AU" dirty="0">
-                <a:latin typeface="Helvetica Neue" charset="0"/>
-              </a:rPr>
-              <a:t>  - </a:t>
-            </a:r>
-            <a:r>
-              <a:rPr lang="en-AU" b="1" dirty="0">
-                <a:latin typeface="Helvetica Neue" charset="0"/>
-              </a:rPr>
-              <a:t>LAN8720A</a:t>
-            </a:r>
-            <a:r>
-              <a:rPr lang="en-AU" dirty="0">
-                <a:latin typeface="Helvetica Neue" charset="0"/>
-              </a:rPr>
-              <a:t> RMII PHY</a:t>
-            </a:r>
-          </a:p>
-          <a:p>
-            <a:pPr>
-              <a:spcBef>
-                <a:spcPts val="0"/>
-              </a:spcBef>
-            </a:pPr>
-            <a:br>
-              <a:rPr lang="en-AU" dirty="0">
-                <a:latin typeface="Helvetica Neue" charset="0"/>
-              </a:rPr>
-            </a:br>
-            <a:r>
-              <a:rPr lang="en-AU" b="1" dirty="0">
-                <a:latin typeface="Helvetica Neue" charset="0"/>
-              </a:rPr>
-              <a:t>NEORV32</a:t>
-            </a:r>
-            <a:r>
-              <a:rPr lang="en-AU" dirty="0">
-                <a:latin typeface="Helvetica Neue" charset="0"/>
-              </a:rPr>
-              <a:t> RISC-V softcore at 80Mhz</a:t>
-            </a:r>
-          </a:p>
-          <a:p>
-            <a:pPr algn="just">
-              <a:spcBef>
-                <a:spcPts val="1200"/>
-              </a:spcBef>
-            </a:pPr>
-            <a:r>
-              <a:rPr lang="en-AU" dirty="0">
-                <a:latin typeface="Helvetica Neue" charset="0"/>
-              </a:rPr>
-              <a:t>Ethernet Controller over Wishbone Classic</a:t>
-            </a:r>
-          </a:p>
-          <a:p>
-            <a:pPr algn="just">
-              <a:spcBef>
-                <a:spcPts val="300"/>
-              </a:spcBef>
-            </a:pPr>
-            <a:r>
-              <a:rPr lang="en-AU" dirty="0">
-                <a:latin typeface="Helvetica Neue" charset="0"/>
-              </a:rPr>
-              <a:t>    - 32-bit wide memory mapped peripheral</a:t>
-            </a:r>
-          </a:p>
-          <a:p>
-            <a:pPr algn="just"/>
-            <a:r>
-              <a:rPr lang="en-AU" dirty="0">
-                <a:latin typeface="Helvetica Neue" charset="0"/>
-              </a:rPr>
-              <a:t>    - computes CRC32 on the fly</a:t>
-            </a:r>
-          </a:p>
-          <a:p>
-            <a:pPr algn="just"/>
-            <a:r>
-              <a:rPr lang="en-AU" dirty="0">
-                <a:latin typeface="Helvetica Neue" charset="0"/>
-              </a:rPr>
-              <a:t>    - designed from scratch</a:t>
+              <a:t>      - designed from scratch</a:t>
             </a:r>
           </a:p>
           <a:p>
@@ -2613,7 +2624,10 @@
             </a:endParaRPr>
           </a:p>
           <a:p>
-            <a:pPr algn="just"/>
+            <a:pPr marL="180000" indent="-180000" algn="just">
+              <a:buFont typeface="Arial" panose="020B0604020202020204" pitchFamily="34" charset="0"/>
+              <a:buChar char="•"/>
+            </a:pPr>
             <a:r>
               <a:rPr lang="en-AU" dirty="0" err="1">
                 <a:latin typeface="Helvetica Neue" charset="0"/>
@@ -2673,13 +2687,15 @@
             </a:r>
           </a:p>
           <a:p>
-            <a:pPr algn="just">
+            <a:pPr marL="180000" indent="-180000" algn="just">
               <a:spcBef>
-                <a:spcPts val="400"/>
+                <a:spcPts val="1000"/>
               </a:spcBef>
               <a:spcAft>
                 <a:spcPts val="0"/>
               </a:spcAft>
+              <a:buFont typeface="Arial" panose="020B0604020202020204" pitchFamily="34" charset="0"/>
+              <a:buChar char="•"/>
             </a:pPr>
             <a:r>
               <a:rPr lang="en-AU" b="1" dirty="0">
@@ -2697,10 +2713,12 @@
             </a:r>
           </a:p>
           <a:p>
-            <a:pPr algn="just">
+            <a:pPr marL="180000" indent="-180000" algn="just">
               <a:spcBef>
-                <a:spcPts val="1200"/>
+                <a:spcPts val="1000"/>
               </a:spcBef>
+              <a:buFont typeface="Arial" panose="020B0604020202020204" pitchFamily="34" charset="0"/>
+              <a:buChar char="•"/>
             </a:pPr>
             <a:r>
               <a:rPr lang="en-AU" dirty="0">
@@ -2725,10 +2743,12 @@
             </a:r>
           </a:p>
           <a:p>
-            <a:pPr algn="just">
+            <a:pPr marL="180000" indent="-180000" algn="just">
               <a:spcBef>
-                <a:spcPts val="1200"/>
+                <a:spcPts val="1000"/>
               </a:spcBef>
+              <a:buFont typeface="Arial" panose="020B0604020202020204" pitchFamily="34" charset="0"/>
+              <a:buChar char="•"/>
             </a:pPr>
             <a:r>
               <a:rPr lang="en-AU" dirty="0">
@@ -2826,20 +2846,6 @@
             </a:endParaRPr>
           </a:p>
           <a:p>
-            <a:pPr algn="just">
-              <a:spcBef>
-                <a:spcPts val="600"/>
-              </a:spcBef>
-              <a:spcAft>
-                <a:spcPts val="200"/>
-              </a:spcAft>
-            </a:pPr>
-            <a:endParaRPr lang="en-AU" sz="1600" dirty="0">
-              <a:latin typeface="Helvetica Neue" charset="0"/>
-              <a:cs typeface="Helvetica Neue" charset="0"/>
-            </a:endParaRPr>
-          </a:p>
-          <a:p>
             <a:endParaRPr lang="en-AU" sz="1800" dirty="0">
               <a:latin typeface="Bodoni MT" charset="0"/>
             </a:endParaRPr>
@@ -2858,10 +2864,12 @@
             </a:r>
           </a:p>
           <a:p>
-            <a:pPr algn="just">
+            <a:pPr marL="180000" indent="-180000" algn="just">
               <a:spcBef>
-                <a:spcPts val="400"/>
+                <a:spcPts val="1000"/>
               </a:spcBef>
+              <a:buFont typeface="Arial" panose="020B0604020202020204" pitchFamily="34" charset="0"/>
+              <a:buChar char="•"/>
             </a:pPr>
             <a:r>
               <a:rPr lang="en-AU" dirty="0">
@@ -2883,10 +2891,12 @@
             </a:r>
           </a:p>
           <a:p>
-            <a:pPr algn="just">
+            <a:pPr marL="180000" indent="-180000" algn="just">
               <a:spcBef>
-                <a:spcPts val="1200"/>
+                <a:spcPts val="1000"/>
               </a:spcBef>
+              <a:buFont typeface="Arial" panose="020B0604020202020204" pitchFamily="34" charset="0"/>
+              <a:buChar char="•"/>
             </a:pPr>
             <a:r>
               <a:rPr lang="en-AU" dirty="0">
@@ -2896,10 +2906,12 @@
             </a:r>
           </a:p>
           <a:p>
-            <a:pPr algn="just">
+            <a:pPr marL="180000" indent="-180000" algn="just">
               <a:spcBef>
-                <a:spcPts val="1200"/>
+                <a:spcPts val="1000"/>
               </a:spcBef>
+              <a:buFont typeface="Arial" panose="020B0604020202020204" pitchFamily="34" charset="0"/>
+              <a:buChar char="•"/>
             </a:pPr>
             <a:r>
               <a:rPr lang="en-AU" dirty="0">
@@ -3036,35 +3048,31 @@
             <a:endParaRPr lang="en-AU" dirty="0"/>
           </a:p>
           <a:p>
-            <a:pPr algn="just">
+            <a:pPr marL="180000" indent="-180000" algn="just">
               <a:spcBef>
                 <a:spcPts val="1000"/>
               </a:spcBef>
-            </a:pPr>
-            <a:endParaRPr lang="en-AU" dirty="0"/>
-          </a:p>
-          <a:p>
-            <a:pPr algn="just">
+              <a:buFont typeface="Arial" panose="020B0604020202020204" pitchFamily="34" charset="0"/>
+              <a:buChar char="•"/>
+            </a:pPr>
+            <a:r>
+              <a:rPr lang="en-AU" dirty="0"/>
+              <a:t>FPGAs are a class of programmable logic that use lookup tables and flip flops to </a:t>
+            </a:r>
+            <a:r>
+              <a:rPr lang="en-AU" dirty="0">
+                <a:latin typeface="Helvetica Neue" charset="0"/>
+              </a:rPr>
+              <a:t>implement digital logic for complete control over data and hardware parallelisation. </a:t>
+            </a:r>
+          </a:p>
+          <a:p>
+            <a:pPr marL="180000" indent="-180000" algn="just">
               <a:spcBef>
                 <a:spcPts val="1000"/>
               </a:spcBef>
-            </a:pPr>
-            <a:r>
-              <a:rPr lang="en-AU" dirty="0"/>
-              <a:t>FPGAs are a class of programmable logic that use lookup tables and flip flops to </a:t>
-            </a:r>
-            <a:r>
-              <a:rPr lang="en-AU" dirty="0">
-                <a:latin typeface="Helvetica Neue" charset="0"/>
-              </a:rPr>
-              <a:t>implement digital logic for complete control over data and hardware parallelisation. </a:t>
-            </a:r>
-          </a:p>
-          <a:p>
-            <a:pPr algn="just">
-              <a:spcBef>
-                <a:spcPts val="1000"/>
-              </a:spcBef>
+              <a:buFont typeface="Arial" panose="020B0604020202020204" pitchFamily="34" charset="0"/>
+              <a:buChar char="•"/>
             </a:pPr>
             <a:r>
               <a:rPr lang="en-AU" dirty="0">
@@ -3122,7 +3130,10 @@
           <a:bodyPr/>
           <a:lstStyle/>
           <a:p>
-            <a:pPr algn="just"/>
+            <a:pPr marL="180000" indent="-180000" algn="just">
+              <a:buFont typeface="Arial" panose="020B0604020202020204" pitchFamily="34" charset="0"/>
+              <a:buChar char="•"/>
+            </a:pPr>
             <a:r>
               <a:rPr lang="en-AU" b="1" dirty="0">
                 <a:latin typeface="Helvetica Neue" charset="0"/>
@@ -3203,6 +3214,10 @@
             </a:r>
           </a:p>
           <a:p>
+            <a:pPr marL="180000" indent="-180000">
+              <a:buFont typeface="Arial" panose="020B0604020202020204" pitchFamily="34" charset="0"/>
+              <a:buChar char="•"/>
+            </a:pPr>
             <a:r>
               <a:rPr lang="en-AU" b="1" dirty="0">
                 <a:latin typeface="Helvetica Neue" charset="0"/>
@@ -3219,6 +3234,10 @@
             </a:r>
           </a:p>
           <a:p>
+            <a:pPr marL="180000" indent="-180000">
+              <a:buFont typeface="Arial" panose="020B0604020202020204" pitchFamily="34" charset="0"/>
+              <a:buChar char="•"/>
+            </a:pPr>
             <a:r>
               <a:rPr lang="en-AU" b="1" dirty="0">
                 <a:latin typeface="Helvetica Neue" charset="0"/>
@@ -3283,6 +3302,10 @@
             </a:endParaRPr>
           </a:p>
           <a:p>
+            <a:pPr marL="180000" indent="-180000">
+              <a:buFont typeface="Arial" panose="020B0604020202020204" pitchFamily="34" charset="0"/>
+              <a:buChar char="•"/>
+            </a:pPr>
             <a:r>
               <a:rPr lang="en-AU" dirty="0">
                 <a:latin typeface="Helvetica Neue" charset="0"/>
@@ -3330,6 +3353,10 @@
             </a:endParaRPr>
           </a:p>
           <a:p>
+            <a:pPr marL="180000" indent="-180000">
+              <a:buFont typeface="Arial" panose="020B0604020202020204" pitchFamily="34" charset="0"/>
+              <a:buChar char="•"/>
+            </a:pPr>
             <a:r>
               <a:rPr lang="en-AU" dirty="0">
                 <a:latin typeface="Helvetica Neue" charset="0"/>
@@ -3449,7 +3476,7 @@
         </p:nvSpPr>
         <p:spPr>
           <a:xfrm>
-            <a:off x="221097" y="3435637"/>
+            <a:off x="253338" y="3640174"/>
             <a:ext cx="3251322" cy="851297"/>
           </a:xfrm>
           <a:prstGeom prst="roundRect">
@@ -3500,7 +3527,7 @@
         </p:nvSpPr>
         <p:spPr>
           <a:xfrm>
-            <a:off x="3964288" y="1284286"/>
+            <a:off x="3964288" y="1166891"/>
             <a:ext cx="3251322" cy="1089660"/>
           </a:xfrm>
           <a:prstGeom prst="roundRect">
@@ -3602,7 +3629,7 @@
         </p:nvSpPr>
         <p:spPr>
           <a:xfrm>
-            <a:off x="236742" y="4422575"/>
+            <a:off x="268437" y="4603954"/>
             <a:ext cx="3251322" cy="851297"/>
           </a:xfrm>
           <a:prstGeom prst="roundRect">

</xml_diff>